<commit_message>
Last push 2 RM
</commit_message>
<xml_diff>
--- a/Courses/PCMAF/PCMAF_26_05_2025.pptx
+++ b/Courses/PCMAF/PCMAF_26_05_2025.pptx
@@ -4,14 +4,23 @@
   <p:sldMasterIdLst>
     <p:sldMasterId id="2147483648" r:id="rId1"/>
   </p:sldMasterIdLst>
+  <p:notesMasterIdLst>
+    <p:notesMasterId r:id="rId15"/>
+  </p:notesMasterIdLst>
   <p:sldIdLst>
-    <p:sldId id="256" r:id="rId2"/>
-    <p:sldId id="261" r:id="rId3"/>
-    <p:sldId id="260" r:id="rId4"/>
-    <p:sldId id="257" r:id="rId5"/>
-    <p:sldId id="258" r:id="rId6"/>
-    <p:sldId id="262" r:id="rId7"/>
-    <p:sldId id="263" r:id="rId8"/>
+    <p:sldId id="308" r:id="rId2"/>
+    <p:sldId id="256" r:id="rId3"/>
+    <p:sldId id="261" r:id="rId4"/>
+    <p:sldId id="260" r:id="rId5"/>
+    <p:sldId id="257" r:id="rId6"/>
+    <p:sldId id="258" r:id="rId7"/>
+    <p:sldId id="262" r:id="rId8"/>
+    <p:sldId id="309" r:id="rId9"/>
+    <p:sldId id="311" r:id="rId10"/>
+    <p:sldId id="263" r:id="rId11"/>
+    <p:sldId id="312" r:id="rId12"/>
+    <p:sldId id="313" r:id="rId13"/>
+    <p:sldId id="314" r:id="rId14"/>
   </p:sldIdLst>
   <p:sldSz cx="12192000" cy="6858000"/>
   <p:notesSz cx="6858000" cy="9144000"/>
@@ -110,7 +119,448 @@
       </a:defRPr>
     </a:lvl9pPr>
   </p:defaultTextStyle>
+  <p:extLst>
+    <p:ext uri="{EFAFB233-063F-42B5-8137-9DF3F51BA10A}">
+      <p15:sldGuideLst xmlns:p15="http://schemas.microsoft.com/office/powerpoint/2012/main"/>
+    </p:ext>
+  </p:extLst>
 </p:presentation>
+</file>
+
+<file path=ppt/notesMasters/notesMaster1.xml><?xml version="1.0" encoding="utf-8"?>
+<p:notesMaster xmlns:a="http://schemas.openxmlformats.org/drawingml/2006/main" xmlns:r="http://schemas.openxmlformats.org/officeDocument/2006/relationships" xmlns:p="http://schemas.openxmlformats.org/presentationml/2006/main">
+  <p:cSld>
+    <p:bg>
+      <p:bgRef idx="1001">
+        <a:schemeClr val="bg1"/>
+      </p:bgRef>
+    </p:bg>
+    <p:spTree>
+      <p:nvGrpSpPr>
+        <p:cNvPr id="1" name=""/>
+        <p:cNvGrpSpPr/>
+        <p:nvPr/>
+      </p:nvGrpSpPr>
+      <p:grpSpPr>
+        <a:xfrm>
+          <a:off x="0" y="0"/>
+          <a:ext cx="0" cy="0"/>
+          <a:chOff x="0" y="0"/>
+          <a:chExt cx="0" cy="0"/>
+        </a:xfrm>
+      </p:grpSpPr>
+      <p:sp>
+        <p:nvSpPr>
+          <p:cNvPr id="2" name="Header Placeholder 1"/>
+          <p:cNvSpPr>
+            <a:spLocks noGrp="1"/>
+          </p:cNvSpPr>
+          <p:nvPr>
+            <p:ph type="hdr" sz="quarter"/>
+          </p:nvPr>
+        </p:nvSpPr>
+        <p:spPr>
+          <a:xfrm>
+            <a:off x="0" y="0"/>
+            <a:ext cx="2971800" cy="458788"/>
+          </a:xfrm>
+          <a:prstGeom prst="rect">
+            <a:avLst/>
+          </a:prstGeom>
+        </p:spPr>
+        <p:txBody>
+          <a:bodyPr vert="horz" lIns="91440" tIns="45720" rIns="91440" bIns="45720" rtlCol="0"/>
+          <a:lstStyle>
+            <a:lvl1pPr algn="l">
+              <a:defRPr sz="1200"/>
+            </a:lvl1pPr>
+          </a:lstStyle>
+          <a:p>
+            <a:endParaRPr lang="en-US"/>
+          </a:p>
+        </p:txBody>
+      </p:sp>
+      <p:sp>
+        <p:nvSpPr>
+          <p:cNvPr id="3" name="Date Placeholder 2"/>
+          <p:cNvSpPr>
+            <a:spLocks noGrp="1"/>
+          </p:cNvSpPr>
+          <p:nvPr>
+            <p:ph type="dt" idx="1"/>
+          </p:nvPr>
+        </p:nvSpPr>
+        <p:spPr>
+          <a:xfrm>
+            <a:off x="3884613" y="0"/>
+            <a:ext cx="2971800" cy="458788"/>
+          </a:xfrm>
+          <a:prstGeom prst="rect">
+            <a:avLst/>
+          </a:prstGeom>
+        </p:spPr>
+        <p:txBody>
+          <a:bodyPr vert="horz" lIns="91440" tIns="45720" rIns="91440" bIns="45720" rtlCol="0"/>
+          <a:lstStyle>
+            <a:lvl1pPr algn="r">
+              <a:defRPr sz="1200"/>
+            </a:lvl1pPr>
+          </a:lstStyle>
+          <a:p>
+            <a:fld id="{F28714EB-CF6A-42BB-AA93-AE74C1947C0E}" type="datetimeFigureOut">
+              <a:rPr lang="en-US" smtClean="0"/>
+              <a:t>6/16/2025</a:t>
+            </a:fld>
+            <a:endParaRPr lang="en-US"/>
+          </a:p>
+        </p:txBody>
+      </p:sp>
+      <p:sp>
+        <p:nvSpPr>
+          <p:cNvPr id="4" name="Slide Image Placeholder 3"/>
+          <p:cNvSpPr>
+            <a:spLocks noGrp="1" noRot="1" noChangeAspect="1"/>
+          </p:cNvSpPr>
+          <p:nvPr>
+            <p:ph type="sldImg" idx="2"/>
+          </p:nvPr>
+        </p:nvSpPr>
+        <p:spPr>
+          <a:xfrm>
+            <a:off x="685800" y="1143000"/>
+            <a:ext cx="5486400" cy="3086100"/>
+          </a:xfrm>
+          <a:prstGeom prst="rect">
+            <a:avLst/>
+          </a:prstGeom>
+          <a:noFill/>
+          <a:ln w="12700">
+            <a:solidFill>
+              <a:prstClr val="black"/>
+            </a:solidFill>
+          </a:ln>
+        </p:spPr>
+        <p:txBody>
+          <a:bodyPr vert="horz" lIns="91440" tIns="45720" rIns="91440" bIns="45720" rtlCol="0" anchor="ctr"/>
+          <a:lstStyle/>
+          <a:p>
+            <a:endParaRPr lang="en-US"/>
+          </a:p>
+        </p:txBody>
+      </p:sp>
+      <p:sp>
+        <p:nvSpPr>
+          <p:cNvPr id="5" name="Notes Placeholder 4"/>
+          <p:cNvSpPr>
+            <a:spLocks noGrp="1"/>
+          </p:cNvSpPr>
+          <p:nvPr>
+            <p:ph type="body" sz="quarter" idx="3"/>
+          </p:nvPr>
+        </p:nvSpPr>
+        <p:spPr>
+          <a:xfrm>
+            <a:off x="685800" y="4400550"/>
+            <a:ext cx="5486400" cy="3600450"/>
+          </a:xfrm>
+          <a:prstGeom prst="rect">
+            <a:avLst/>
+          </a:prstGeom>
+        </p:spPr>
+        <p:txBody>
+          <a:bodyPr vert="horz" lIns="91440" tIns="45720" rIns="91440" bIns="45720" rtlCol="0"/>
+          <a:lstStyle/>
+          <a:p>
+            <a:pPr lvl="0"/>
+            <a:r>
+              <a:rPr lang="en-US"/>
+              <a:t>Click to edit Master text styles</a:t>
+            </a:r>
+          </a:p>
+          <a:p>
+            <a:pPr lvl="1"/>
+            <a:r>
+              <a:rPr lang="en-US"/>
+              <a:t>Second level</a:t>
+            </a:r>
+          </a:p>
+          <a:p>
+            <a:pPr lvl="2"/>
+            <a:r>
+              <a:rPr lang="en-US"/>
+              <a:t>Third level</a:t>
+            </a:r>
+          </a:p>
+          <a:p>
+            <a:pPr lvl="3"/>
+            <a:r>
+              <a:rPr lang="en-US"/>
+              <a:t>Fourth level</a:t>
+            </a:r>
+          </a:p>
+          <a:p>
+            <a:pPr lvl="4"/>
+            <a:r>
+              <a:rPr lang="en-US"/>
+              <a:t>Fifth level</a:t>
+            </a:r>
+          </a:p>
+        </p:txBody>
+      </p:sp>
+      <p:sp>
+        <p:nvSpPr>
+          <p:cNvPr id="6" name="Footer Placeholder 5"/>
+          <p:cNvSpPr>
+            <a:spLocks noGrp="1"/>
+          </p:cNvSpPr>
+          <p:nvPr>
+            <p:ph type="ftr" sz="quarter" idx="4"/>
+          </p:nvPr>
+        </p:nvSpPr>
+        <p:spPr>
+          <a:xfrm>
+            <a:off x="0" y="8685213"/>
+            <a:ext cx="2971800" cy="458787"/>
+          </a:xfrm>
+          <a:prstGeom prst="rect">
+            <a:avLst/>
+          </a:prstGeom>
+        </p:spPr>
+        <p:txBody>
+          <a:bodyPr vert="horz" lIns="91440" tIns="45720" rIns="91440" bIns="45720" rtlCol="0" anchor="b"/>
+          <a:lstStyle>
+            <a:lvl1pPr algn="l">
+              <a:defRPr sz="1200"/>
+            </a:lvl1pPr>
+          </a:lstStyle>
+          <a:p>
+            <a:endParaRPr lang="en-US"/>
+          </a:p>
+        </p:txBody>
+      </p:sp>
+      <p:sp>
+        <p:nvSpPr>
+          <p:cNvPr id="7" name="Slide Number Placeholder 6"/>
+          <p:cNvSpPr>
+            <a:spLocks noGrp="1"/>
+          </p:cNvSpPr>
+          <p:nvPr>
+            <p:ph type="sldNum" sz="quarter" idx="5"/>
+          </p:nvPr>
+        </p:nvSpPr>
+        <p:spPr>
+          <a:xfrm>
+            <a:off x="3884613" y="8685213"/>
+            <a:ext cx="2971800" cy="458787"/>
+          </a:xfrm>
+          <a:prstGeom prst="rect">
+            <a:avLst/>
+          </a:prstGeom>
+        </p:spPr>
+        <p:txBody>
+          <a:bodyPr vert="horz" lIns="91440" tIns="45720" rIns="91440" bIns="45720" rtlCol="0" anchor="b"/>
+          <a:lstStyle>
+            <a:lvl1pPr algn="r">
+              <a:defRPr sz="1200"/>
+            </a:lvl1pPr>
+          </a:lstStyle>
+          <a:p>
+            <a:fld id="{BCEE3D62-C9F4-472E-966A-8D1D956B79F7}" type="slidenum">
+              <a:rPr lang="en-US" smtClean="0"/>
+              <a:t>‹#›</a:t>
+            </a:fld>
+            <a:endParaRPr lang="en-US"/>
+          </a:p>
+        </p:txBody>
+      </p:sp>
+    </p:spTree>
+    <p:extLst>
+      <p:ext uri="{BB962C8B-B14F-4D97-AF65-F5344CB8AC3E}">
+        <p14:creationId xmlns:p14="http://schemas.microsoft.com/office/powerpoint/2010/main" val="841877570"/>
+      </p:ext>
+    </p:extLst>
+  </p:cSld>
+  <p:clrMap bg1="lt1" tx1="dk1" bg2="lt2" tx2="dk2" accent1="accent1" accent2="accent2" accent3="accent3" accent4="accent4" accent5="accent5" accent6="accent6" hlink="hlink" folHlink="folHlink"/>
+  <p:notesStyle>
+    <a:lvl1pPr marL="0" algn="l" defTabSz="914400" rtl="0" eaLnBrk="1" latinLnBrk="0" hangingPunct="1">
+      <a:defRPr sz="1200" kern="1200">
+        <a:solidFill>
+          <a:schemeClr val="tx1"/>
+        </a:solidFill>
+        <a:latin typeface="+mn-lt"/>
+        <a:ea typeface="+mn-ea"/>
+        <a:cs typeface="+mn-cs"/>
+      </a:defRPr>
+    </a:lvl1pPr>
+    <a:lvl2pPr marL="457200" algn="l" defTabSz="914400" rtl="0" eaLnBrk="1" latinLnBrk="0" hangingPunct="1">
+      <a:defRPr sz="1200" kern="1200">
+        <a:solidFill>
+          <a:schemeClr val="tx1"/>
+        </a:solidFill>
+        <a:latin typeface="+mn-lt"/>
+        <a:ea typeface="+mn-ea"/>
+        <a:cs typeface="+mn-cs"/>
+      </a:defRPr>
+    </a:lvl2pPr>
+    <a:lvl3pPr marL="914400" algn="l" defTabSz="914400" rtl="0" eaLnBrk="1" latinLnBrk="0" hangingPunct="1">
+      <a:defRPr sz="1200" kern="1200">
+        <a:solidFill>
+          <a:schemeClr val="tx1"/>
+        </a:solidFill>
+        <a:latin typeface="+mn-lt"/>
+        <a:ea typeface="+mn-ea"/>
+        <a:cs typeface="+mn-cs"/>
+      </a:defRPr>
+    </a:lvl3pPr>
+    <a:lvl4pPr marL="1371600" algn="l" defTabSz="914400" rtl="0" eaLnBrk="1" latinLnBrk="0" hangingPunct="1">
+      <a:defRPr sz="1200" kern="1200">
+        <a:solidFill>
+          <a:schemeClr val="tx1"/>
+        </a:solidFill>
+        <a:latin typeface="+mn-lt"/>
+        <a:ea typeface="+mn-ea"/>
+        <a:cs typeface="+mn-cs"/>
+      </a:defRPr>
+    </a:lvl4pPr>
+    <a:lvl5pPr marL="1828800" algn="l" defTabSz="914400" rtl="0" eaLnBrk="1" latinLnBrk="0" hangingPunct="1">
+      <a:defRPr sz="1200" kern="1200">
+        <a:solidFill>
+          <a:schemeClr val="tx1"/>
+        </a:solidFill>
+        <a:latin typeface="+mn-lt"/>
+        <a:ea typeface="+mn-ea"/>
+        <a:cs typeface="+mn-cs"/>
+      </a:defRPr>
+    </a:lvl5pPr>
+    <a:lvl6pPr marL="2286000" algn="l" defTabSz="914400" rtl="0" eaLnBrk="1" latinLnBrk="0" hangingPunct="1">
+      <a:defRPr sz="1200" kern="1200">
+        <a:solidFill>
+          <a:schemeClr val="tx1"/>
+        </a:solidFill>
+        <a:latin typeface="+mn-lt"/>
+        <a:ea typeface="+mn-ea"/>
+        <a:cs typeface="+mn-cs"/>
+      </a:defRPr>
+    </a:lvl6pPr>
+    <a:lvl7pPr marL="2743200" algn="l" defTabSz="914400" rtl="0" eaLnBrk="1" latinLnBrk="0" hangingPunct="1">
+      <a:defRPr sz="1200" kern="1200">
+        <a:solidFill>
+          <a:schemeClr val="tx1"/>
+        </a:solidFill>
+        <a:latin typeface="+mn-lt"/>
+        <a:ea typeface="+mn-ea"/>
+        <a:cs typeface="+mn-cs"/>
+      </a:defRPr>
+    </a:lvl7pPr>
+    <a:lvl8pPr marL="3200400" algn="l" defTabSz="914400" rtl="0" eaLnBrk="1" latinLnBrk="0" hangingPunct="1">
+      <a:defRPr sz="1200" kern="1200">
+        <a:solidFill>
+          <a:schemeClr val="tx1"/>
+        </a:solidFill>
+        <a:latin typeface="+mn-lt"/>
+        <a:ea typeface="+mn-ea"/>
+        <a:cs typeface="+mn-cs"/>
+      </a:defRPr>
+    </a:lvl8pPr>
+    <a:lvl9pPr marL="3657600" algn="l" defTabSz="914400" rtl="0" eaLnBrk="1" latinLnBrk="0" hangingPunct="1">
+      <a:defRPr sz="1200" kern="1200">
+        <a:solidFill>
+          <a:schemeClr val="tx1"/>
+        </a:solidFill>
+        <a:latin typeface="+mn-lt"/>
+        <a:ea typeface="+mn-ea"/>
+        <a:cs typeface="+mn-cs"/>
+      </a:defRPr>
+    </a:lvl9pPr>
+  </p:notesStyle>
+</p:notesMaster>
+</file>
+
+<file path=ppt/notesSlides/notesSlide1.xml><?xml version="1.0" encoding="utf-8"?>
+<p:notes xmlns:a="http://schemas.openxmlformats.org/drawingml/2006/main" xmlns:r="http://schemas.openxmlformats.org/officeDocument/2006/relationships" xmlns:p="http://schemas.openxmlformats.org/presentationml/2006/main">
+  <p:cSld>
+    <p:spTree>
+      <p:nvGrpSpPr>
+        <p:cNvPr id="1" name=""/>
+        <p:cNvGrpSpPr/>
+        <p:nvPr/>
+      </p:nvGrpSpPr>
+      <p:grpSpPr>
+        <a:xfrm>
+          <a:off x="0" y="0"/>
+          <a:ext cx="0" cy="0"/>
+          <a:chOff x="0" y="0"/>
+          <a:chExt cx="0" cy="0"/>
+        </a:xfrm>
+      </p:grpSpPr>
+      <p:sp>
+        <p:nvSpPr>
+          <p:cNvPr id="2" name="Slide Image Placeholder 1"/>
+          <p:cNvSpPr>
+            <a:spLocks noGrp="1" noRot="1" noChangeAspect="1"/>
+          </p:cNvSpPr>
+          <p:nvPr>
+            <p:ph type="sldImg"/>
+          </p:nvPr>
+        </p:nvSpPr>
+        <p:spPr/>
+      </p:sp>
+      <p:sp>
+        <p:nvSpPr>
+          <p:cNvPr id="3" name="Notes Placeholder 2"/>
+          <p:cNvSpPr>
+            <a:spLocks noGrp="1"/>
+          </p:cNvSpPr>
+          <p:nvPr>
+            <p:ph type="body" idx="1"/>
+          </p:nvPr>
+        </p:nvSpPr>
+        <p:spPr/>
+        <p:txBody>
+          <a:bodyPr/>
+          <a:lstStyle/>
+          <a:p>
+            <a:r>
+              <a:rPr lang="en-US" dirty="0"/>
+              <a:t>Michele M.</a:t>
+            </a:r>
+          </a:p>
+        </p:txBody>
+      </p:sp>
+      <p:sp>
+        <p:nvSpPr>
+          <p:cNvPr id="4" name="Slide Number Placeholder 3"/>
+          <p:cNvSpPr>
+            <a:spLocks noGrp="1"/>
+          </p:cNvSpPr>
+          <p:nvPr>
+            <p:ph type="sldNum" sz="quarter" idx="5"/>
+          </p:nvPr>
+        </p:nvSpPr>
+        <p:spPr/>
+        <p:txBody>
+          <a:bodyPr/>
+          <a:lstStyle/>
+          <a:p>
+            <a:fld id="{8AF32E14-C631-49AF-B6B0-D490372E1139}" type="slidenum">
+              <a:rPr lang="en-US" smtClean="0"/>
+              <a:t>1</a:t>
+            </a:fld>
+            <a:endParaRPr lang="en-US"/>
+          </a:p>
+        </p:txBody>
+      </p:sp>
+    </p:spTree>
+    <p:extLst>
+      <p:ext uri="{BB962C8B-B14F-4D97-AF65-F5344CB8AC3E}">
+        <p14:creationId xmlns:p14="http://schemas.microsoft.com/office/powerpoint/2010/main" val="1986883116"/>
+      </p:ext>
+    </p:extLst>
+  </p:cSld>
+  <p:clrMapOvr>
+    <a:masterClrMapping/>
+  </p:clrMapOvr>
+</p:notes>
 </file>
 
 <file path=ppt/slideLayouts/slideLayout1.xml><?xml version="1.0" encoding="utf-8"?>
@@ -260,7 +710,7 @@
           <a:p>
             <a:fld id="{83F63EE6-990C-4118-A593-A786E0D5E742}" type="datetimeFigureOut">
               <a:rPr lang="en-US" smtClean="0"/>
-              <a:t>5/26/2025</a:t>
+              <a:t>6/16/2025</a:t>
             </a:fld>
             <a:endParaRPr lang="en-US"/>
           </a:p>
@@ -458,7 +908,7 @@
           <a:p>
             <a:fld id="{83F63EE6-990C-4118-A593-A786E0D5E742}" type="datetimeFigureOut">
               <a:rPr lang="en-US" smtClean="0"/>
-              <a:t>5/26/2025</a:t>
+              <a:t>6/16/2025</a:t>
             </a:fld>
             <a:endParaRPr lang="en-US"/>
           </a:p>
@@ -666,7 +1116,7 @@
           <a:p>
             <a:fld id="{83F63EE6-990C-4118-A593-A786E0D5E742}" type="datetimeFigureOut">
               <a:rPr lang="en-US" smtClean="0"/>
-              <a:t>5/26/2025</a:t>
+              <a:t>6/16/2025</a:t>
             </a:fld>
             <a:endParaRPr lang="en-US"/>
           </a:p>
@@ -864,7 +1314,7 @@
           <a:p>
             <a:fld id="{83F63EE6-990C-4118-A593-A786E0D5E742}" type="datetimeFigureOut">
               <a:rPr lang="en-US" smtClean="0"/>
-              <a:t>5/26/2025</a:t>
+              <a:t>6/16/2025</a:t>
             </a:fld>
             <a:endParaRPr lang="en-US"/>
           </a:p>
@@ -1139,7 +1589,7 @@
           <a:p>
             <a:fld id="{83F63EE6-990C-4118-A593-A786E0D5E742}" type="datetimeFigureOut">
               <a:rPr lang="en-US" smtClean="0"/>
-              <a:t>5/26/2025</a:t>
+              <a:t>6/16/2025</a:t>
             </a:fld>
             <a:endParaRPr lang="en-US"/>
           </a:p>
@@ -1404,7 +1854,7 @@
           <a:p>
             <a:fld id="{83F63EE6-990C-4118-A593-A786E0D5E742}" type="datetimeFigureOut">
               <a:rPr lang="en-US" smtClean="0"/>
-              <a:t>5/26/2025</a:t>
+              <a:t>6/16/2025</a:t>
             </a:fld>
             <a:endParaRPr lang="en-US"/>
           </a:p>
@@ -1816,7 +2266,7 @@
           <a:p>
             <a:fld id="{83F63EE6-990C-4118-A593-A786E0D5E742}" type="datetimeFigureOut">
               <a:rPr lang="en-US" smtClean="0"/>
-              <a:t>5/26/2025</a:t>
+              <a:t>6/16/2025</a:t>
             </a:fld>
             <a:endParaRPr lang="en-US"/>
           </a:p>
@@ -1957,7 +2407,7 @@
           <a:p>
             <a:fld id="{83F63EE6-990C-4118-A593-A786E0D5E742}" type="datetimeFigureOut">
               <a:rPr lang="en-US" smtClean="0"/>
-              <a:t>5/26/2025</a:t>
+              <a:t>6/16/2025</a:t>
             </a:fld>
             <a:endParaRPr lang="en-US"/>
           </a:p>
@@ -2070,7 +2520,7 @@
           <a:p>
             <a:fld id="{83F63EE6-990C-4118-A593-A786E0D5E742}" type="datetimeFigureOut">
               <a:rPr lang="en-US" smtClean="0"/>
-              <a:t>5/26/2025</a:t>
+              <a:t>6/16/2025</a:t>
             </a:fld>
             <a:endParaRPr lang="en-US"/>
           </a:p>
@@ -2381,7 +2831,7 @@
           <a:p>
             <a:fld id="{83F63EE6-990C-4118-A593-A786E0D5E742}" type="datetimeFigureOut">
               <a:rPr lang="en-US" smtClean="0"/>
-              <a:t>5/26/2025</a:t>
+              <a:t>6/16/2025</a:t>
             </a:fld>
             <a:endParaRPr lang="en-US"/>
           </a:p>
@@ -2669,7 +3119,7 @@
           <a:p>
             <a:fld id="{83F63EE6-990C-4118-A593-A786E0D5E742}" type="datetimeFigureOut">
               <a:rPr lang="en-US" smtClean="0"/>
-              <a:t>5/26/2025</a:t>
+              <a:t>6/16/2025</a:t>
             </a:fld>
             <a:endParaRPr lang="en-US"/>
           </a:p>
@@ -2910,7 +3360,7 @@
           <a:p>
             <a:fld id="{83F63EE6-990C-4118-A593-A786E0D5E742}" type="datetimeFigureOut">
               <a:rPr lang="en-US" smtClean="0"/>
-              <a:t>5/26/2025</a:t>
+              <a:t>6/16/2025</a:t>
             </a:fld>
             <a:endParaRPr lang="en-US"/>
           </a:p>
@@ -3329,10 +3779,464 @@
       </p:grpSpPr>
       <p:pic>
         <p:nvPicPr>
-          <p:cNvPr id="39" name="Picture 38" descr="A diagram of a graph showing the temperature&#10;&#10;AI-generated content may be incorrect.">
-            <a:extLst>
-              <a:ext uri="{FF2B5EF4-FFF2-40B4-BE49-F238E27FC236}">
-                <a16:creationId xmlns:a16="http://schemas.microsoft.com/office/drawing/2014/main" id="{6FD3D9AB-8A58-8A99-67DC-4DB00632AE1E}"/>
+          <p:cNvPr id="7" name="Image 6" descr="Une image contenant nature, Minéral, Outil de pierre, rocher&#10;&#10;Description générée automatiquement">
+            <a:extLst>
+              <a:ext uri="{FF2B5EF4-FFF2-40B4-BE49-F238E27FC236}">
+                <a16:creationId xmlns:a16="http://schemas.microsoft.com/office/drawing/2014/main" id="{FFADE351-791A-BA45-052E-6DBA7DCFEC92}"/>
+              </a:ext>
+            </a:extLst>
+          </p:cNvPr>
+          <p:cNvPicPr>
+            <a:picLocks noChangeAspect="1"/>
+          </p:cNvPicPr>
+          <p:nvPr/>
+        </p:nvPicPr>
+        <p:blipFill rotWithShape="1">
+          <a:blip r:embed="rId3">
+            <a:alphaModFix/>
+            <a:extLst>
+              <a:ext uri="{28A0092B-C50C-407E-A947-70E740481C1C}">
+                <a14:useLocalDpi xmlns:a14="http://schemas.microsoft.com/office/drawing/2010/main" val="0"/>
+              </a:ext>
+            </a:extLst>
+          </a:blip>
+          <a:srcRect l="-198012" t="117239" r="198012" b="-136700"/>
+          <a:stretch/>
+        </p:blipFill>
+        <p:spPr>
+          <a:xfrm>
+            <a:off x="-447902" y="5646709"/>
+            <a:ext cx="1483325" cy="1447020"/>
+          </a:xfrm>
+          <a:prstGeom prst="rect">
+            <a:avLst/>
+          </a:prstGeom>
+        </p:spPr>
+      </p:pic>
+      <p:sp>
+        <p:nvSpPr>
+          <p:cNvPr id="11" name="Espace réservé du numéro de diapositive 10">
+            <a:extLst>
+              <a:ext uri="{FF2B5EF4-FFF2-40B4-BE49-F238E27FC236}">
+                <a16:creationId xmlns:a16="http://schemas.microsoft.com/office/drawing/2014/main" id="{9FDFA3DE-0DCC-7717-8634-17A56A7EF5BB}"/>
+              </a:ext>
+            </a:extLst>
+          </p:cNvPr>
+          <p:cNvSpPr>
+            <a:spLocks noGrp="1"/>
+          </p:cNvSpPr>
+          <p:nvPr>
+            <p:ph type="sldNum" sz="quarter" idx="12"/>
+          </p:nvPr>
+        </p:nvSpPr>
+        <p:spPr/>
+        <p:txBody>
+          <a:bodyPr/>
+          <a:lstStyle/>
+          <a:p>
+            <a:fld id="{BD6585DC-AF6F-4F47-B5F1-9B77F7A5C769}" type="slidenum">
+              <a:rPr lang="en-US" noProof="0" smtClean="0"/>
+              <a:t>1</a:t>
+            </a:fld>
+            <a:endParaRPr lang="en-US" noProof="0" dirty="0"/>
+          </a:p>
+        </p:txBody>
+      </p:sp>
+      <p:sp>
+        <p:nvSpPr>
+          <p:cNvPr id="12" name="ZoneTexte 11">
+            <a:extLst>
+              <a:ext uri="{FF2B5EF4-FFF2-40B4-BE49-F238E27FC236}">
+                <a16:creationId xmlns:a16="http://schemas.microsoft.com/office/drawing/2014/main" id="{C7B3E038-2C04-2DC7-9906-009FE1E7F88D}"/>
+              </a:ext>
+            </a:extLst>
+          </p:cNvPr>
+          <p:cNvSpPr txBox="1"/>
+          <p:nvPr/>
+        </p:nvSpPr>
+        <p:spPr>
+          <a:xfrm>
+            <a:off x="1461654" y="2361779"/>
+            <a:ext cx="9268691" cy="1200329"/>
+          </a:xfrm>
+          <a:prstGeom prst="rect">
+            <a:avLst/>
+          </a:prstGeom>
+          <a:noFill/>
+        </p:spPr>
+        <p:txBody>
+          <a:bodyPr wrap="square" rtlCol="0">
+            <a:spAutoFit/>
+          </a:bodyPr>
+          <a:lstStyle/>
+          <a:p>
+            <a:pPr algn="ctr"/>
+            <a:r>
+              <a:rPr lang="en-US" sz="3600" b="1" noProof="0" dirty="0">
+                <a:solidFill>
+                  <a:schemeClr val="accent1"/>
+                </a:solidFill>
+              </a:rPr>
+              <a:t>0D reactor for fast and reliable wall heat flux computation</a:t>
+            </a:r>
+            <a:endParaRPr lang="en-US" sz="2800" b="1" noProof="0" dirty="0">
+              <a:solidFill>
+                <a:schemeClr val="accent1"/>
+              </a:solidFill>
+            </a:endParaRPr>
+          </a:p>
+        </p:txBody>
+      </p:sp>
+      <p:sp>
+        <p:nvSpPr>
+          <p:cNvPr id="28" name="ZoneTexte 27">
+            <a:extLst>
+              <a:ext uri="{FF2B5EF4-FFF2-40B4-BE49-F238E27FC236}">
+                <a16:creationId xmlns:a16="http://schemas.microsoft.com/office/drawing/2014/main" id="{39B4C2C6-0336-0D1A-8A2E-04687981BFC3}"/>
+              </a:ext>
+            </a:extLst>
+          </p:cNvPr>
+          <p:cNvSpPr txBox="1"/>
+          <p:nvPr/>
+        </p:nvSpPr>
+        <p:spPr>
+          <a:xfrm>
+            <a:off x="838200" y="5818380"/>
+            <a:ext cx="2545662" cy="400110"/>
+          </a:xfrm>
+          <a:prstGeom prst="rect">
+            <a:avLst/>
+          </a:prstGeom>
+          <a:noFill/>
+        </p:spPr>
+        <p:txBody>
+          <a:bodyPr wrap="square" rtlCol="0">
+            <a:spAutoFit/>
+          </a:bodyPr>
+          <a:lstStyle/>
+          <a:p>
+            <a:pPr algn="ctr"/>
+            <a:r>
+              <a:rPr lang="en-US" sz="2000" noProof="0" dirty="0"/>
+              <a:t>Justin Pesesse</a:t>
+            </a:r>
+          </a:p>
+        </p:txBody>
+      </p:sp>
+      <p:sp>
+        <p:nvSpPr>
+          <p:cNvPr id="2" name="Freeform 5">
+            <a:extLst>
+              <a:ext uri="{FF2B5EF4-FFF2-40B4-BE49-F238E27FC236}">
+                <a16:creationId xmlns:a16="http://schemas.microsoft.com/office/drawing/2014/main" id="{6117E0AE-D1DB-3151-4454-1209E0DC7174}"/>
+              </a:ext>
+            </a:extLst>
+          </p:cNvPr>
+          <p:cNvSpPr/>
+          <p:nvPr/>
+        </p:nvSpPr>
+        <p:spPr>
+          <a:xfrm>
+            <a:off x="162398" y="152111"/>
+            <a:ext cx="2949298" cy="785044"/>
+          </a:xfrm>
+          <a:custGeom>
+            <a:avLst/>
+            <a:gdLst/>
+            <a:ahLst/>
+            <a:cxnLst/>
+            <a:rect l="l" t="t" r="r" b="b"/>
+            <a:pathLst>
+              <a:path w="6844037" h="1919182">
+                <a:moveTo>
+                  <a:pt x="0" y="0"/>
+                </a:moveTo>
+                <a:lnTo>
+                  <a:pt x="6844037" y="0"/>
+                </a:lnTo>
+                <a:lnTo>
+                  <a:pt x="6844037" y="1919182"/>
+                </a:lnTo>
+                <a:lnTo>
+                  <a:pt x="0" y="1919182"/>
+                </a:lnTo>
+                <a:lnTo>
+                  <a:pt x="0" y="0"/>
+                </a:lnTo>
+                <a:close/>
+              </a:path>
+            </a:pathLst>
+          </a:custGeom>
+          <a:blipFill>
+            <a:blip r:embed="rId4">
+              <a:extLst>
+                <a:ext uri="{BEBA8EAE-BF5A-486C-A8C5-ECC9F3942E4B}">
+                  <a14:imgProps xmlns:a14="http://schemas.microsoft.com/office/drawing/2010/main">
+                    <a14:imgLayer r:embed="rId5">
+                      <a14:imgEffect>
+                        <a14:colorTemperature colorTemp="6200"/>
+                      </a14:imgEffect>
+                    </a14:imgLayer>
+                  </a14:imgProps>
+                </a:ext>
+              </a:extLst>
+            </a:blip>
+            <a:stretch>
+              <a:fillRect/>
+            </a:stretch>
+          </a:blipFill>
+        </p:spPr>
+        <p:txBody>
+          <a:bodyPr/>
+          <a:lstStyle>
+            <a:defPPr>
+              <a:defRPr lang="it-IT"/>
+            </a:defPPr>
+            <a:lvl1pPr marL="0" algn="l" defTabSz="457200" rtl="0" eaLnBrk="1" latinLnBrk="0" hangingPunct="1">
+              <a:defRPr sz="1800" kern="1200">
+                <a:solidFill>
+                  <a:schemeClr val="tx1"/>
+                </a:solidFill>
+                <a:latin typeface="+mn-lt"/>
+                <a:ea typeface="+mn-ea"/>
+                <a:cs typeface="+mn-cs"/>
+              </a:defRPr>
+            </a:lvl1pPr>
+            <a:lvl2pPr marL="457200" algn="l" defTabSz="457200" rtl="0" eaLnBrk="1" latinLnBrk="0" hangingPunct="1">
+              <a:defRPr sz="1800" kern="1200">
+                <a:solidFill>
+                  <a:schemeClr val="tx1"/>
+                </a:solidFill>
+                <a:latin typeface="+mn-lt"/>
+                <a:ea typeface="+mn-ea"/>
+                <a:cs typeface="+mn-cs"/>
+              </a:defRPr>
+            </a:lvl2pPr>
+            <a:lvl3pPr marL="914400" algn="l" defTabSz="457200" rtl="0" eaLnBrk="1" latinLnBrk="0" hangingPunct="1">
+              <a:defRPr sz="1800" kern="1200">
+                <a:solidFill>
+                  <a:schemeClr val="tx1"/>
+                </a:solidFill>
+                <a:latin typeface="+mn-lt"/>
+                <a:ea typeface="+mn-ea"/>
+                <a:cs typeface="+mn-cs"/>
+              </a:defRPr>
+            </a:lvl3pPr>
+            <a:lvl4pPr marL="1371600" algn="l" defTabSz="457200" rtl="0" eaLnBrk="1" latinLnBrk="0" hangingPunct="1">
+              <a:defRPr sz="1800" kern="1200">
+                <a:solidFill>
+                  <a:schemeClr val="tx1"/>
+                </a:solidFill>
+                <a:latin typeface="+mn-lt"/>
+                <a:ea typeface="+mn-ea"/>
+                <a:cs typeface="+mn-cs"/>
+              </a:defRPr>
+            </a:lvl4pPr>
+            <a:lvl5pPr marL="1828800" algn="l" defTabSz="457200" rtl="0" eaLnBrk="1" latinLnBrk="0" hangingPunct="1">
+              <a:defRPr sz="1800" kern="1200">
+                <a:solidFill>
+                  <a:schemeClr val="tx1"/>
+                </a:solidFill>
+                <a:latin typeface="+mn-lt"/>
+                <a:ea typeface="+mn-ea"/>
+                <a:cs typeface="+mn-cs"/>
+              </a:defRPr>
+            </a:lvl5pPr>
+            <a:lvl6pPr marL="2286000" algn="l" defTabSz="457200" rtl="0" eaLnBrk="1" latinLnBrk="0" hangingPunct="1">
+              <a:defRPr sz="1800" kern="1200">
+                <a:solidFill>
+                  <a:schemeClr val="tx1"/>
+                </a:solidFill>
+                <a:latin typeface="+mn-lt"/>
+                <a:ea typeface="+mn-ea"/>
+                <a:cs typeface="+mn-cs"/>
+              </a:defRPr>
+            </a:lvl6pPr>
+            <a:lvl7pPr marL="2743200" algn="l" defTabSz="457200" rtl="0" eaLnBrk="1" latinLnBrk="0" hangingPunct="1">
+              <a:defRPr sz="1800" kern="1200">
+                <a:solidFill>
+                  <a:schemeClr val="tx1"/>
+                </a:solidFill>
+                <a:latin typeface="+mn-lt"/>
+                <a:ea typeface="+mn-ea"/>
+                <a:cs typeface="+mn-cs"/>
+              </a:defRPr>
+            </a:lvl7pPr>
+            <a:lvl8pPr marL="3200400" algn="l" defTabSz="457200" rtl="0" eaLnBrk="1" latinLnBrk="0" hangingPunct="1">
+              <a:defRPr sz="1800" kern="1200">
+                <a:solidFill>
+                  <a:schemeClr val="tx1"/>
+                </a:solidFill>
+                <a:latin typeface="+mn-lt"/>
+                <a:ea typeface="+mn-ea"/>
+                <a:cs typeface="+mn-cs"/>
+              </a:defRPr>
+            </a:lvl8pPr>
+            <a:lvl9pPr marL="3657600" algn="l" defTabSz="457200" rtl="0" eaLnBrk="1" latinLnBrk="0" hangingPunct="1">
+              <a:defRPr sz="1800" kern="1200">
+                <a:solidFill>
+                  <a:schemeClr val="tx1"/>
+                </a:solidFill>
+                <a:latin typeface="+mn-lt"/>
+                <a:ea typeface="+mn-ea"/>
+                <a:cs typeface="+mn-cs"/>
+              </a:defRPr>
+            </a:lvl9pPr>
+          </a:lstStyle>
+          <a:p>
+            <a:endParaRPr lang="en-US" noProof="0" dirty="0"/>
+          </a:p>
+        </p:txBody>
+      </p:sp>
+      <p:sp>
+        <p:nvSpPr>
+          <p:cNvPr id="5" name="Date Placeholder 4">
+            <a:extLst>
+              <a:ext uri="{FF2B5EF4-FFF2-40B4-BE49-F238E27FC236}">
+                <a16:creationId xmlns:a16="http://schemas.microsoft.com/office/drawing/2014/main" id="{05186B2E-7FBF-28CC-53EE-A64DEF8B3502}"/>
+              </a:ext>
+            </a:extLst>
+          </p:cNvPr>
+          <p:cNvSpPr>
+            <a:spLocks noGrp="1"/>
+          </p:cNvSpPr>
+          <p:nvPr>
+            <p:ph type="dt" sz="half" idx="10"/>
+          </p:nvPr>
+        </p:nvSpPr>
+        <p:spPr/>
+        <p:txBody>
+          <a:bodyPr/>
+          <a:lstStyle/>
+          <a:p>
+            <a:fld id="{2252B6C2-F0D1-491E-A61B-4A5E161759DE}" type="datetime1">
+              <a:rPr lang="en-US" noProof="0" smtClean="0"/>
+              <a:t>6/16/2025</a:t>
+            </a:fld>
+            <a:endParaRPr lang="en-US" noProof="0" dirty="0"/>
+          </a:p>
+        </p:txBody>
+      </p:sp>
+      <p:sp>
+        <p:nvSpPr>
+          <p:cNvPr id="3" name="TextBox 2">
+            <a:extLst>
+              <a:ext uri="{FF2B5EF4-FFF2-40B4-BE49-F238E27FC236}">
+                <a16:creationId xmlns:a16="http://schemas.microsoft.com/office/drawing/2014/main" id="{3FDE3069-337F-D096-5542-68B0B346BC4A}"/>
+              </a:ext>
+            </a:extLst>
+          </p:cNvPr>
+          <p:cNvSpPr txBox="1"/>
+          <p:nvPr/>
+        </p:nvSpPr>
+        <p:spPr>
+          <a:xfrm>
+            <a:off x="5217071" y="3866622"/>
+            <a:ext cx="1757855" cy="369332"/>
+          </a:xfrm>
+          <a:prstGeom prst="rect">
+            <a:avLst/>
+          </a:prstGeom>
+          <a:noFill/>
+        </p:spPr>
+        <p:txBody>
+          <a:bodyPr wrap="square" rtlCol="0">
+            <a:spAutoFit/>
+          </a:bodyPr>
+          <a:lstStyle/>
+          <a:p>
+            <a:r>
+              <a:rPr lang="en-US" b="1" dirty="0">
+                <a:solidFill>
+                  <a:schemeClr val="accent1"/>
+                </a:solidFill>
+              </a:rPr>
+              <a:t>PCMAF exam</a:t>
+            </a:r>
+          </a:p>
+        </p:txBody>
+      </p:sp>
+    </p:spTree>
+    <p:extLst>
+      <p:ext uri="{BB962C8B-B14F-4D97-AF65-F5344CB8AC3E}">
+        <p14:creationId xmlns:p14="http://schemas.microsoft.com/office/powerpoint/2010/main" val="693755070"/>
+      </p:ext>
+    </p:extLst>
+  </p:cSld>
+  <p:clrMapOvr>
+    <a:masterClrMapping/>
+  </p:clrMapOvr>
+</p:sld>
+</file>
+
+<file path=ppt/slides/slide10.xml><?xml version="1.0" encoding="utf-8"?>
+<p:sld xmlns:a="http://schemas.openxmlformats.org/drawingml/2006/main" xmlns:r="http://schemas.openxmlformats.org/officeDocument/2006/relationships" xmlns:p="http://schemas.openxmlformats.org/presentationml/2006/main">
+  <p:cSld>
+    <p:spTree>
+      <p:nvGrpSpPr>
+        <p:cNvPr id="1" name="">
+          <a:extLst>
+            <a:ext uri="{FF2B5EF4-FFF2-40B4-BE49-F238E27FC236}">
+              <a16:creationId xmlns:a16="http://schemas.microsoft.com/office/drawing/2014/main" id="{0898638E-D575-3189-0E36-03EE0D736765}"/>
+            </a:ext>
+          </a:extLst>
+        </p:cNvPr>
+        <p:cNvGrpSpPr/>
+        <p:nvPr/>
+      </p:nvGrpSpPr>
+      <p:grpSpPr>
+        <a:xfrm>
+          <a:off x="0" y="0"/>
+          <a:ext cx="0" cy="0"/>
+          <a:chOff x="0" y="0"/>
+          <a:chExt cx="0" cy="0"/>
+        </a:xfrm>
+      </p:grpSpPr>
+      <p:sp>
+        <p:nvSpPr>
+          <p:cNvPr id="4" name="TextBox 3">
+            <a:extLst>
+              <a:ext uri="{FF2B5EF4-FFF2-40B4-BE49-F238E27FC236}">
+                <a16:creationId xmlns:a16="http://schemas.microsoft.com/office/drawing/2014/main" id="{EC458042-5585-D700-D297-07142C4A545B}"/>
+              </a:ext>
+            </a:extLst>
+          </p:cNvPr>
+          <p:cNvSpPr txBox="1"/>
+          <p:nvPr/>
+        </p:nvSpPr>
+        <p:spPr>
+          <a:xfrm>
+            <a:off x="678384" y="504825"/>
+            <a:ext cx="7400925" cy="461665"/>
+          </a:xfrm>
+          <a:prstGeom prst="rect">
+            <a:avLst/>
+          </a:prstGeom>
+          <a:noFill/>
+        </p:spPr>
+        <p:txBody>
+          <a:bodyPr wrap="square" rtlCol="0">
+            <a:spAutoFit/>
+          </a:bodyPr>
+          <a:lstStyle/>
+          <a:p>
+            <a:r>
+              <a:rPr lang="en-US" sz="2400" b="1" dirty="0">
+                <a:solidFill>
+                  <a:schemeClr val="accent1"/>
+                </a:solidFill>
+              </a:rPr>
+              <a:t>0D reactor with surrogate model data </a:t>
+            </a:r>
+          </a:p>
+        </p:txBody>
+      </p:sp>
+      <p:pic>
+        <p:nvPicPr>
+          <p:cNvPr id="6" name="Picture 5" descr="A graph of a graph with a grid and a diagram&#10;&#10;AI-generated content may be incorrect.">
+            <a:extLst>
+              <a:ext uri="{FF2B5EF4-FFF2-40B4-BE49-F238E27FC236}">
+                <a16:creationId xmlns:a16="http://schemas.microsoft.com/office/drawing/2014/main" id="{FF599504-9333-0838-A660-240FA2ED02D5}"/>
               </a:ext>
             </a:extLst>
           </p:cNvPr>
@@ -3355,20 +4259,92 @@
         </p:blipFill>
         <p:spPr>
           <a:xfrm>
-            <a:off x="303730" y="1013650"/>
-            <a:ext cx="7687033" cy="5731056"/>
+            <a:off x="2649820" y="1170397"/>
+            <a:ext cx="6892359" cy="5449650"/>
           </a:xfrm>
           <a:prstGeom prst="rect">
             <a:avLst/>
           </a:prstGeom>
         </p:spPr>
       </p:pic>
-      <p:sp>
-        <p:nvSpPr>
-          <p:cNvPr id="40" name="TextBox 39">
-            <a:extLst>
-              <a:ext uri="{FF2B5EF4-FFF2-40B4-BE49-F238E27FC236}">
-                <a16:creationId xmlns:a16="http://schemas.microsoft.com/office/drawing/2014/main" id="{E17C37DE-C863-4D5D-6708-D8AAC8BCD496}"/>
+    </p:spTree>
+    <p:extLst>
+      <p:ext uri="{BB962C8B-B14F-4D97-AF65-F5344CB8AC3E}">
+        <p14:creationId xmlns:p14="http://schemas.microsoft.com/office/powerpoint/2010/main" val="2495170865"/>
+      </p:ext>
+    </p:extLst>
+  </p:cSld>
+  <p:clrMapOvr>
+    <a:masterClrMapping/>
+  </p:clrMapOvr>
+</p:sld>
+</file>
+
+<file path=ppt/slides/slide11.xml><?xml version="1.0" encoding="utf-8"?>
+<p:sld xmlns:a="http://schemas.openxmlformats.org/drawingml/2006/main" xmlns:r="http://schemas.openxmlformats.org/officeDocument/2006/relationships" xmlns:p="http://schemas.openxmlformats.org/presentationml/2006/main">
+  <p:cSld>
+    <p:spTree>
+      <p:nvGrpSpPr>
+        <p:cNvPr id="1" name="">
+          <a:extLst>
+            <a:ext uri="{FF2B5EF4-FFF2-40B4-BE49-F238E27FC236}">
+              <a16:creationId xmlns:a16="http://schemas.microsoft.com/office/drawing/2014/main" id="{F6DC3204-209E-6B99-9AC1-0935BFBF7891}"/>
+            </a:ext>
+          </a:extLst>
+        </p:cNvPr>
+        <p:cNvGrpSpPr/>
+        <p:nvPr/>
+      </p:nvGrpSpPr>
+      <p:grpSpPr>
+        <a:xfrm>
+          <a:off x="0" y="0"/>
+          <a:ext cx="0" cy="0"/>
+          <a:chOff x="0" y="0"/>
+          <a:chExt cx="0" cy="0"/>
+        </a:xfrm>
+      </p:grpSpPr>
+      <p:pic>
+        <p:nvPicPr>
+          <p:cNvPr id="4" name="Picture 3" descr="A green and yellow gradient&#10;&#10;AI-generated content may be incorrect.">
+            <a:extLst>
+              <a:ext uri="{FF2B5EF4-FFF2-40B4-BE49-F238E27FC236}">
+                <a16:creationId xmlns:a16="http://schemas.microsoft.com/office/drawing/2014/main" id="{EA1DE3A4-6950-1452-CE9F-E4C414AC09FC}"/>
+              </a:ext>
+            </a:extLst>
+          </p:cNvPr>
+          <p:cNvPicPr>
+            <a:picLocks noChangeAspect="1"/>
+          </p:cNvPicPr>
+          <p:nvPr/>
+        </p:nvPicPr>
+        <p:blipFill>
+          <a:blip r:embed="rId2">
+            <a:extLst>
+              <a:ext uri="{28A0092B-C50C-407E-A947-70E740481C1C}">
+                <a14:useLocalDpi xmlns:a14="http://schemas.microsoft.com/office/drawing/2010/main" val="0"/>
+              </a:ext>
+            </a:extLst>
+          </a:blip>
+          <a:stretch>
+            <a:fillRect/>
+          </a:stretch>
+        </p:blipFill>
+        <p:spPr>
+          <a:xfrm>
+            <a:off x="1795479" y="990979"/>
+            <a:ext cx="7992757" cy="5747663"/>
+          </a:xfrm>
+          <a:prstGeom prst="rect">
+            <a:avLst/>
+          </a:prstGeom>
+        </p:spPr>
+      </p:pic>
+      <p:sp>
+        <p:nvSpPr>
+          <p:cNvPr id="5" name="TextBox 4">
+            <a:extLst>
+              <a:ext uri="{FF2B5EF4-FFF2-40B4-BE49-F238E27FC236}">
+                <a16:creationId xmlns:a16="http://schemas.microsoft.com/office/drawing/2014/main" id="{15498C1D-0330-64E1-C86A-D71E1BDBC262}"/>
               </a:ext>
             </a:extLst>
           </p:cNvPr>
@@ -3377,8 +4353,8 @@
         </p:nvSpPr>
         <p:spPr>
           <a:xfrm>
-            <a:off x="1600200" y="644318"/>
-            <a:ext cx="5559137" cy="369332"/>
+            <a:off x="678384" y="504825"/>
+            <a:ext cx="7400925" cy="461665"/>
           </a:xfrm>
           <a:prstGeom prst="rect">
             <a:avLst/>
@@ -3391,18 +4367,454 @@
           </a:bodyPr>
           <a:lstStyle/>
           <a:p>
-            <a:pPr algn="ctr"/>
-            <a:r>
-              <a:rPr lang="en-US" b="1" dirty="0" err="1"/>
+            <a:r>
+              <a:rPr lang="en-US" sz="2400" b="1" dirty="0">
+                <a:solidFill>
+                  <a:schemeClr val="accent1"/>
+                </a:solidFill>
+              </a:rPr>
+              <a:t>0D reactor with surrogate model data </a:t>
+            </a:r>
+          </a:p>
+        </p:txBody>
+      </p:sp>
+    </p:spTree>
+    <p:extLst>
+      <p:ext uri="{BB962C8B-B14F-4D97-AF65-F5344CB8AC3E}">
+        <p14:creationId xmlns:p14="http://schemas.microsoft.com/office/powerpoint/2010/main" val="251644483"/>
+      </p:ext>
+    </p:extLst>
+  </p:cSld>
+  <p:clrMapOvr>
+    <a:masterClrMapping/>
+  </p:clrMapOvr>
+</p:sld>
+</file>
+
+<file path=ppt/slides/slide12.xml><?xml version="1.0" encoding="utf-8"?>
+<p:sld xmlns:a="http://schemas.openxmlformats.org/drawingml/2006/main" xmlns:r="http://schemas.openxmlformats.org/officeDocument/2006/relationships" xmlns:p="http://schemas.openxmlformats.org/presentationml/2006/main">
+  <p:cSld>
+    <p:spTree>
+      <p:nvGrpSpPr>
+        <p:cNvPr id="1" name="">
+          <a:extLst>
+            <a:ext uri="{FF2B5EF4-FFF2-40B4-BE49-F238E27FC236}">
+              <a16:creationId xmlns:a16="http://schemas.microsoft.com/office/drawing/2014/main" id="{FB54C97D-4731-3DCE-3494-3BE17CDC492D}"/>
+            </a:ext>
+          </a:extLst>
+        </p:cNvPr>
+        <p:cNvGrpSpPr/>
+        <p:nvPr/>
+      </p:nvGrpSpPr>
+      <p:grpSpPr>
+        <a:xfrm>
+          <a:off x="0" y="0"/>
+          <a:ext cx="0" cy="0"/>
+          <a:chOff x="0" y="0"/>
+          <a:chExt cx="0" cy="0"/>
+        </a:xfrm>
+      </p:grpSpPr>
+      <p:sp>
+        <p:nvSpPr>
+          <p:cNvPr id="5" name="TextBox 4">
+            <a:extLst>
+              <a:ext uri="{FF2B5EF4-FFF2-40B4-BE49-F238E27FC236}">
+                <a16:creationId xmlns:a16="http://schemas.microsoft.com/office/drawing/2014/main" id="{7E4AB3AF-50E7-BCDA-49AD-BDC28A56E681}"/>
+              </a:ext>
+            </a:extLst>
+          </p:cNvPr>
+          <p:cNvSpPr txBox="1"/>
+          <p:nvPr/>
+        </p:nvSpPr>
+        <p:spPr>
+          <a:xfrm>
+            <a:off x="678384" y="504825"/>
+            <a:ext cx="7930484" cy="461665"/>
+          </a:xfrm>
+          <a:prstGeom prst="rect">
+            <a:avLst/>
+          </a:prstGeom>
+          <a:noFill/>
+        </p:spPr>
+        <p:txBody>
+          <a:bodyPr wrap="square" rtlCol="0">
+            <a:spAutoFit/>
+          </a:bodyPr>
+          <a:lstStyle/>
+          <a:p>
+            <a:r>
+              <a:rPr lang="en-US" sz="2400" b="1" dirty="0">
+                <a:solidFill>
+                  <a:schemeClr val="accent1"/>
+                </a:solidFill>
+              </a:rPr>
+              <a:t>0D reactor with surrogate model data : linear regression</a:t>
+            </a:r>
+          </a:p>
+        </p:txBody>
+      </p:sp>
+      <p:pic>
+        <p:nvPicPr>
+          <p:cNvPr id="3" name="Picture 2" descr="A graph of a graph showing a grid with a colorful gradient&#10;&#10;AI-generated content may be incorrect.">
+            <a:extLst>
+              <a:ext uri="{FF2B5EF4-FFF2-40B4-BE49-F238E27FC236}">
+                <a16:creationId xmlns:a16="http://schemas.microsoft.com/office/drawing/2014/main" id="{9D439C1C-361E-607A-0491-25CFAD666429}"/>
+              </a:ext>
+            </a:extLst>
+          </p:cNvPr>
+          <p:cNvPicPr>
+            <a:picLocks noChangeAspect="1"/>
+          </p:cNvPicPr>
+          <p:nvPr/>
+        </p:nvPicPr>
+        <p:blipFill>
+          <a:blip r:embed="rId2">
+            <a:extLst>
+              <a:ext uri="{28A0092B-C50C-407E-A947-70E740481C1C}">
+                <a14:useLocalDpi xmlns:a14="http://schemas.microsoft.com/office/drawing/2010/main" val="0"/>
+              </a:ext>
+            </a:extLst>
+          </a:blip>
+          <a:stretch>
+            <a:fillRect/>
+          </a:stretch>
+        </p:blipFill>
+        <p:spPr>
+          <a:xfrm>
+            <a:off x="0" y="1474637"/>
+            <a:ext cx="7169736" cy="5018815"/>
+          </a:xfrm>
+          <a:prstGeom prst="rect">
+            <a:avLst/>
+          </a:prstGeom>
+        </p:spPr>
+      </p:pic>
+      <p:sp>
+        <p:nvSpPr>
+          <p:cNvPr id="6" name="TextBox 5">
+            <a:extLst>
+              <a:ext uri="{FF2B5EF4-FFF2-40B4-BE49-F238E27FC236}">
+                <a16:creationId xmlns:a16="http://schemas.microsoft.com/office/drawing/2014/main" id="{D8629794-A73B-5F52-7402-413BF83993B7}"/>
+              </a:ext>
+            </a:extLst>
+          </p:cNvPr>
+          <p:cNvSpPr txBox="1"/>
+          <p:nvPr/>
+        </p:nvSpPr>
+        <p:spPr>
+          <a:xfrm>
+            <a:off x="7081405" y="2395105"/>
+            <a:ext cx="3392631" cy="1754326"/>
+          </a:xfrm>
+          <a:prstGeom prst="rect">
+            <a:avLst/>
+          </a:prstGeom>
+          <a:noFill/>
+        </p:spPr>
+        <p:txBody>
+          <a:bodyPr wrap="square" rtlCol="0">
+            <a:spAutoFit/>
+          </a:bodyPr>
+          <a:lstStyle/>
+          <a:p>
+            <a:r>
+              <a:rPr lang="en-US" b="1" dirty="0"/>
+              <a:t>NRMSE : 12.54%</a:t>
+            </a:r>
+          </a:p>
+          <a:p>
+            <a:endParaRPr lang="en-US" b="1" dirty="0"/>
+          </a:p>
+          <a:p>
+            <a:pPr marL="285750" indent="-285750">
+              <a:buFont typeface="Arial" panose="020B0604020202020204" pitchFamily="34" charset="0"/>
+              <a:buChar char="•"/>
+            </a:pPr>
+            <a:r>
+              <a:rPr lang="en-US" dirty="0"/>
+              <a:t>Linear trend is observed</a:t>
+            </a:r>
+          </a:p>
+          <a:p>
+            <a:pPr marL="285750" indent="-285750">
+              <a:buFont typeface="Arial" panose="020B0604020202020204" pitchFamily="34" charset="0"/>
+              <a:buChar char="•"/>
+            </a:pPr>
+            <a:endParaRPr lang="en-US" dirty="0"/>
+          </a:p>
+          <a:p>
+            <a:pPr marL="285750" indent="-285750">
+              <a:buFont typeface="Arial" panose="020B0604020202020204" pitchFamily="34" charset="0"/>
+              <a:buChar char="•"/>
+            </a:pPr>
+            <a:r>
+              <a:rPr lang="en-US" dirty="0"/>
+              <a:t>Linear regression is too simple for the problem </a:t>
+            </a:r>
+          </a:p>
+        </p:txBody>
+      </p:sp>
+    </p:spTree>
+    <p:extLst>
+      <p:ext uri="{BB962C8B-B14F-4D97-AF65-F5344CB8AC3E}">
+        <p14:creationId xmlns:p14="http://schemas.microsoft.com/office/powerpoint/2010/main" val="2699945884"/>
+      </p:ext>
+    </p:extLst>
+  </p:cSld>
+  <p:clrMapOvr>
+    <a:masterClrMapping/>
+  </p:clrMapOvr>
+</p:sld>
+</file>
+
+<file path=ppt/slides/slide13.xml><?xml version="1.0" encoding="utf-8"?>
+<p:sld xmlns:a="http://schemas.openxmlformats.org/drawingml/2006/main" xmlns:r="http://schemas.openxmlformats.org/officeDocument/2006/relationships" xmlns:p="http://schemas.openxmlformats.org/presentationml/2006/main">
+  <p:cSld>
+    <p:spTree>
+      <p:nvGrpSpPr>
+        <p:cNvPr id="1" name="">
+          <a:extLst>
+            <a:ext uri="{FF2B5EF4-FFF2-40B4-BE49-F238E27FC236}">
+              <a16:creationId xmlns:a16="http://schemas.microsoft.com/office/drawing/2014/main" id="{A21D59FE-A3DF-7483-C9FA-F64BE6AF8529}"/>
+            </a:ext>
+          </a:extLst>
+        </p:cNvPr>
+        <p:cNvGrpSpPr/>
+        <p:nvPr/>
+      </p:nvGrpSpPr>
+      <p:grpSpPr>
+        <a:xfrm>
+          <a:off x="0" y="0"/>
+          <a:ext cx="0" cy="0"/>
+          <a:chOff x="0" y="0"/>
+          <a:chExt cx="0" cy="0"/>
+        </a:xfrm>
+      </p:grpSpPr>
+      <p:sp>
+        <p:nvSpPr>
+          <p:cNvPr id="5" name="TextBox 4">
+            <a:extLst>
+              <a:ext uri="{FF2B5EF4-FFF2-40B4-BE49-F238E27FC236}">
+                <a16:creationId xmlns:a16="http://schemas.microsoft.com/office/drawing/2014/main" id="{B653C67E-7EEC-BA73-5413-33CF1EFECF1D}"/>
+              </a:ext>
+            </a:extLst>
+          </p:cNvPr>
+          <p:cNvSpPr txBox="1"/>
+          <p:nvPr/>
+        </p:nvSpPr>
+        <p:spPr>
+          <a:xfrm>
+            <a:off x="678384" y="504825"/>
+            <a:ext cx="7930484" cy="830997"/>
+          </a:xfrm>
+          <a:prstGeom prst="rect">
+            <a:avLst/>
+          </a:prstGeom>
+          <a:noFill/>
+        </p:spPr>
+        <p:txBody>
+          <a:bodyPr wrap="square" rtlCol="0">
+            <a:spAutoFit/>
+          </a:bodyPr>
+          <a:lstStyle/>
+          <a:p>
+            <a:r>
+              <a:rPr lang="en-US" sz="2400" b="1" dirty="0">
+                <a:solidFill>
+                  <a:schemeClr val="accent1"/>
+                </a:solidFill>
+              </a:rPr>
+              <a:t>0D reactor with surrogate model data : Advanced ML tools ?</a:t>
+            </a:r>
+          </a:p>
+        </p:txBody>
+      </p:sp>
+      <p:sp>
+        <p:nvSpPr>
+          <p:cNvPr id="2" name="TextBox 1">
+            <a:extLst>
+              <a:ext uri="{FF2B5EF4-FFF2-40B4-BE49-F238E27FC236}">
+                <a16:creationId xmlns:a16="http://schemas.microsoft.com/office/drawing/2014/main" id="{5B748E5D-EF16-EA92-36A5-54C995BF3A63}"/>
+              </a:ext>
+            </a:extLst>
+          </p:cNvPr>
+          <p:cNvSpPr txBox="1"/>
+          <p:nvPr/>
+        </p:nvSpPr>
+        <p:spPr>
+          <a:xfrm>
+            <a:off x="1059873" y="1844386"/>
+            <a:ext cx="5569527" cy="2585323"/>
+          </a:xfrm>
+          <a:prstGeom prst="rect">
+            <a:avLst/>
+          </a:prstGeom>
+          <a:noFill/>
+        </p:spPr>
+        <p:txBody>
+          <a:bodyPr wrap="square" rtlCol="0">
+            <a:spAutoFit/>
+          </a:bodyPr>
+          <a:lstStyle/>
+          <a:p>
+            <a:r>
+              <a:rPr lang="en-US" dirty="0"/>
+              <a:t>Future work: </a:t>
+            </a:r>
+          </a:p>
+          <a:p>
+            <a:endParaRPr lang="en-US" dirty="0"/>
+          </a:p>
+          <a:p>
+            <a:pPr marL="285750" indent="-285750">
+              <a:buFont typeface="Arial" panose="020B0604020202020204" pitchFamily="34" charset="0"/>
+              <a:buChar char="•"/>
+            </a:pPr>
+            <a:r>
+              <a:rPr lang="en-US" dirty="0"/>
+              <a:t>Use advance ML tools for higher accuracy ?</a:t>
+            </a:r>
+          </a:p>
+          <a:p>
+            <a:pPr marL="285750" indent="-285750">
+              <a:buFont typeface="Arial" panose="020B0604020202020204" pitchFamily="34" charset="0"/>
+              <a:buChar char="•"/>
+            </a:pPr>
+            <a:endParaRPr lang="en-US" dirty="0"/>
+          </a:p>
+          <a:p>
+            <a:pPr marL="285750" indent="-285750">
+              <a:buFont typeface="Arial" panose="020B0604020202020204" pitchFamily="34" charset="0"/>
+              <a:buChar char="•"/>
+            </a:pPr>
+            <a:r>
+              <a:rPr lang="en-US" dirty="0"/>
+              <a:t>In depth study on the behavior of </a:t>
+            </a:r>
+            <a:r>
+              <a:rPr lang="en-US" dirty="0" err="1"/>
+              <a:t>dx_diff</a:t>
+            </a:r>
+            <a:r>
+              <a:rPr lang="en-US" dirty="0"/>
+              <a:t> ?</a:t>
+            </a:r>
+          </a:p>
+          <a:p>
+            <a:pPr marL="285750" indent="-285750">
+              <a:buFont typeface="Arial" panose="020B0604020202020204" pitchFamily="34" charset="0"/>
+              <a:buChar char="•"/>
+            </a:pPr>
+            <a:endParaRPr lang="en-US" dirty="0"/>
+          </a:p>
+          <a:p>
+            <a:pPr marL="285750" indent="-285750">
+              <a:buFont typeface="Arial" panose="020B0604020202020204" pitchFamily="34" charset="0"/>
+              <a:buChar char="•"/>
+            </a:pPr>
+            <a:r>
+              <a:rPr lang="en-US" dirty="0"/>
+              <a:t>Test dx model on </a:t>
+            </a:r>
+            <a:r>
+              <a:rPr lang="en-US" dirty="0" err="1"/>
+              <a:t>unconverged</a:t>
+            </a:r>
+            <a:r>
+              <a:rPr lang="en-US" dirty="0"/>
+              <a:t> </a:t>
+            </a:r>
+            <a:r>
+              <a:rPr lang="en-US" dirty="0" err="1"/>
               <a:t>Stagline</a:t>
             </a:r>
             <a:r>
-              <a:rPr lang="en-US" b="1" dirty="0"/>
-              <a:t> simulation for surrogate model training</a:t>
-            </a:r>
-          </a:p>
-        </p:txBody>
-      </p:sp>
+              <a:rPr lang="en-US" dirty="0"/>
+              <a:t> </a:t>
+            </a:r>
+          </a:p>
+          <a:p>
+            <a:pPr marL="285750" indent="-285750">
+              <a:buFont typeface="Arial" panose="020B0604020202020204" pitchFamily="34" charset="0"/>
+              <a:buChar char="•"/>
+            </a:pPr>
+            <a:endParaRPr lang="en-US" dirty="0"/>
+          </a:p>
+          <a:p>
+            <a:pPr marL="285750" indent="-285750">
+              <a:buFont typeface="Arial" panose="020B0604020202020204" pitchFamily="34" charset="0"/>
+              <a:buChar char="•"/>
+            </a:pPr>
+            <a:endParaRPr lang="en-US" dirty="0"/>
+          </a:p>
+        </p:txBody>
+      </p:sp>
+    </p:spTree>
+    <p:extLst>
+      <p:ext uri="{BB962C8B-B14F-4D97-AF65-F5344CB8AC3E}">
+        <p14:creationId xmlns:p14="http://schemas.microsoft.com/office/powerpoint/2010/main" val="306482867"/>
+      </p:ext>
+    </p:extLst>
+  </p:cSld>
+  <p:clrMapOvr>
+    <a:masterClrMapping/>
+  </p:clrMapOvr>
+</p:sld>
+</file>
+
+<file path=ppt/slides/slide2.xml><?xml version="1.0" encoding="utf-8"?>
+<p:sld xmlns:a="http://schemas.openxmlformats.org/drawingml/2006/main" xmlns:r="http://schemas.openxmlformats.org/officeDocument/2006/relationships" xmlns:p="http://schemas.openxmlformats.org/presentationml/2006/main">
+  <p:cSld>
+    <p:spTree>
+      <p:nvGrpSpPr>
+        <p:cNvPr id="1" name=""/>
+        <p:cNvGrpSpPr/>
+        <p:nvPr/>
+      </p:nvGrpSpPr>
+      <p:grpSpPr>
+        <a:xfrm>
+          <a:off x="0" y="0"/>
+          <a:ext cx="0" cy="0"/>
+          <a:chOff x="0" y="0"/>
+          <a:chExt cx="0" cy="0"/>
+        </a:xfrm>
+      </p:grpSpPr>
+      <p:pic>
+        <p:nvPicPr>
+          <p:cNvPr id="39" name="Picture 38" descr="A diagram of a graph showing the temperature&#10;&#10;AI-generated content may be incorrect.">
+            <a:extLst>
+              <a:ext uri="{FF2B5EF4-FFF2-40B4-BE49-F238E27FC236}">
+                <a16:creationId xmlns:a16="http://schemas.microsoft.com/office/drawing/2014/main" id="{6FD3D9AB-8A58-8A99-67DC-4DB00632AE1E}"/>
+              </a:ext>
+            </a:extLst>
+          </p:cNvPr>
+          <p:cNvPicPr>
+            <a:picLocks noChangeAspect="1"/>
+          </p:cNvPicPr>
+          <p:nvPr/>
+        </p:nvPicPr>
+        <p:blipFill>
+          <a:blip r:embed="rId2">
+            <a:extLst>
+              <a:ext uri="{28A0092B-C50C-407E-A947-70E740481C1C}">
+                <a14:useLocalDpi xmlns:a14="http://schemas.microsoft.com/office/drawing/2010/main" val="0"/>
+              </a:ext>
+            </a:extLst>
+          </a:blip>
+          <a:stretch>
+            <a:fillRect/>
+          </a:stretch>
+        </p:blipFill>
+        <p:spPr>
+          <a:xfrm>
+            <a:off x="303730" y="1008455"/>
+            <a:ext cx="7687033" cy="5731056"/>
+          </a:xfrm>
+          <a:prstGeom prst="rect">
+            <a:avLst/>
+          </a:prstGeom>
+        </p:spPr>
+      </p:pic>
       <p:sp>
         <p:nvSpPr>
           <p:cNvPr id="42" name="TextBox 41">
@@ -3558,6 +4970,54 @@
           </a:p>
         </p:txBody>
       </p:sp>
+      <p:sp>
+        <p:nvSpPr>
+          <p:cNvPr id="5" name="TextBox 4">
+            <a:extLst>
+              <a:ext uri="{FF2B5EF4-FFF2-40B4-BE49-F238E27FC236}">
+                <a16:creationId xmlns:a16="http://schemas.microsoft.com/office/drawing/2014/main" id="{94FBEC69-014B-8F09-5AE7-A268164BD444}"/>
+              </a:ext>
+            </a:extLst>
+          </p:cNvPr>
+          <p:cNvSpPr txBox="1"/>
+          <p:nvPr/>
+        </p:nvSpPr>
+        <p:spPr>
+          <a:xfrm>
+            <a:off x="678384" y="504825"/>
+            <a:ext cx="7400925" cy="461665"/>
+          </a:xfrm>
+          <a:prstGeom prst="rect">
+            <a:avLst/>
+          </a:prstGeom>
+          <a:noFill/>
+        </p:spPr>
+        <p:txBody>
+          <a:bodyPr wrap="square" rtlCol="0">
+            <a:spAutoFit/>
+          </a:bodyPr>
+          <a:lstStyle/>
+          <a:p>
+            <a:pPr algn="ctr"/>
+            <a:r>
+              <a:rPr lang="en-US" sz="2400" b="1" dirty="0" err="1">
+                <a:solidFill>
+                  <a:schemeClr val="accent1"/>
+                </a:solidFill>
+              </a:rPr>
+              <a:t>Stagline</a:t>
+            </a:r>
+            <a:r>
+              <a:rPr lang="en-US" sz="2400" b="1" dirty="0">
+                <a:solidFill>
+                  <a:schemeClr val="accent1"/>
+                </a:solidFill>
+              </a:rPr>
+              <a:t> simulation for surrogate model training</a:t>
+            </a:r>
+          </a:p>
+        </p:txBody>
+      </p:sp>
     </p:spTree>
     <p:extLst>
       <p:ext uri="{BB962C8B-B14F-4D97-AF65-F5344CB8AC3E}">
@@ -3571,7 +5031,7 @@
 </p:sld>
 </file>
 
-<file path=ppt/slides/slide2.xml><?xml version="1.0" encoding="utf-8"?>
+<file path=ppt/slides/slide3.xml><?xml version="1.0" encoding="utf-8"?>
 <p:sld xmlns:a="http://schemas.openxmlformats.org/drawingml/2006/main" xmlns:r="http://schemas.openxmlformats.org/officeDocument/2006/relationships" xmlns:p="http://schemas.openxmlformats.org/presentationml/2006/main">
   <p:cSld>
     <p:spTree>
@@ -3608,7 +5068,7 @@
         </p:nvSpPr>
         <p:spPr>
           <a:xfrm>
-            <a:off x="4161558" y="1454728"/>
+            <a:off x="4166753" y="2182092"/>
             <a:ext cx="3190009" cy="1143000"/>
           </a:xfrm>
           <a:prstGeom prst="rect">
@@ -3672,7 +5132,7 @@
         </p:nvSpPr>
         <p:spPr>
           <a:xfrm>
-            <a:off x="3471861" y="477982"/>
+            <a:off x="3477056" y="1205346"/>
             <a:ext cx="4569402" cy="369332"/>
           </a:xfrm>
           <a:prstGeom prst="rect">
@@ -3735,7 +5195,7 @@
         </p:nvCxnSpPr>
         <p:spPr>
           <a:xfrm>
-            <a:off x="5756562" y="847314"/>
+            <a:off x="5761757" y="1574678"/>
             <a:ext cx="1" cy="607414"/>
           </a:xfrm>
           <a:prstGeom prst="straightConnector1">
@@ -3788,7 +5248,7 @@
         </p:blipFill>
         <p:spPr>
           <a:xfrm>
-            <a:off x="2636532" y="3944580"/>
+            <a:off x="2641727" y="4671944"/>
             <a:ext cx="3411914" cy="1062200"/>
           </a:xfrm>
           <a:prstGeom prst="rect">
@@ -3824,7 +5284,7 @@
         </p:blipFill>
         <p:spPr>
           <a:xfrm>
-            <a:off x="6142446" y="3772357"/>
+            <a:off x="6147641" y="4499721"/>
             <a:ext cx="2418242" cy="1406645"/>
           </a:xfrm>
           <a:prstGeom prst="rect">
@@ -3848,7 +5308,7 @@
         </p:nvCxnSpPr>
         <p:spPr>
           <a:xfrm flipV="1">
-            <a:off x="7916450" y="4048944"/>
+            <a:off x="7921645" y="4776308"/>
             <a:ext cx="930500" cy="298786"/>
           </a:xfrm>
           <a:prstGeom prst="straightConnector1">
@@ -3887,7 +5347,7 @@
         </p:nvSpPr>
         <p:spPr>
           <a:xfrm>
-            <a:off x="8909295" y="3864278"/>
+            <a:off x="8914490" y="4591642"/>
             <a:ext cx="2135332" cy="369332"/>
           </a:xfrm>
           <a:prstGeom prst="rect">
@@ -3924,7 +5384,7 @@
         </p:nvCxnSpPr>
         <p:spPr>
           <a:xfrm>
-            <a:off x="7724188" y="5006780"/>
+            <a:off x="7729383" y="5734144"/>
             <a:ext cx="457744" cy="517673"/>
           </a:xfrm>
           <a:prstGeom prst="straightConnector1">
@@ -3963,7 +5423,7 @@
         </p:nvSpPr>
         <p:spPr>
           <a:xfrm>
-            <a:off x="8181932" y="5364355"/>
+            <a:off x="8187127" y="6091719"/>
             <a:ext cx="2135332" cy="646331"/>
           </a:xfrm>
           <a:prstGeom prst="rect">
@@ -3998,7 +5458,7 @@
         </p:nvSpPr>
         <p:spPr>
           <a:xfrm>
-            <a:off x="8909295" y="3864278"/>
+            <a:off x="8914490" y="4591642"/>
             <a:ext cx="2052205" cy="369332"/>
           </a:xfrm>
           <a:prstGeom prst="rect">
@@ -4053,7 +5513,7 @@
         </p:nvCxnSpPr>
         <p:spPr>
           <a:xfrm>
-            <a:off x="5756563" y="2597728"/>
+            <a:off x="5761758" y="3325092"/>
             <a:ext cx="0" cy="1058917"/>
           </a:xfrm>
           <a:prstGeom prst="straightConnector1">
@@ -4078,6 +5538,45 @@
           </a:fontRef>
         </p:style>
       </p:cxnSp>
+      <p:sp>
+        <p:nvSpPr>
+          <p:cNvPr id="8" name="TextBox 7">
+            <a:extLst>
+              <a:ext uri="{FF2B5EF4-FFF2-40B4-BE49-F238E27FC236}">
+                <a16:creationId xmlns:a16="http://schemas.microsoft.com/office/drawing/2014/main" id="{527A20C0-E520-2AD8-BA88-9773B01F50FD}"/>
+              </a:ext>
+            </a:extLst>
+          </p:cNvPr>
+          <p:cNvSpPr txBox="1"/>
+          <p:nvPr/>
+        </p:nvSpPr>
+        <p:spPr>
+          <a:xfrm>
+            <a:off x="678384" y="504825"/>
+            <a:ext cx="7400925" cy="461665"/>
+          </a:xfrm>
+          <a:prstGeom prst="rect">
+            <a:avLst/>
+          </a:prstGeom>
+          <a:noFill/>
+        </p:spPr>
+        <p:txBody>
+          <a:bodyPr wrap="square" rtlCol="0">
+            <a:spAutoFit/>
+          </a:bodyPr>
+          <a:lstStyle/>
+          <a:p>
+            <a:r>
+              <a:rPr lang="en-US" sz="2400" b="1" dirty="0">
+                <a:solidFill>
+                  <a:schemeClr val="accent1"/>
+                </a:solidFill>
+              </a:rPr>
+              <a:t>0D reactor with experimental data</a:t>
+            </a:r>
+          </a:p>
+        </p:txBody>
+      </p:sp>
     </p:spTree>
     <p:extLst>
       <p:ext uri="{BB962C8B-B14F-4D97-AF65-F5344CB8AC3E}">
@@ -4091,7 +5590,7 @@
 </p:sld>
 </file>
 
-<file path=ppt/slides/slide3.xml><?xml version="1.0" encoding="utf-8"?>
+<file path=ppt/slides/slide4.xml><?xml version="1.0" encoding="utf-8"?>
 <p:sld xmlns:a="http://schemas.openxmlformats.org/drawingml/2006/main" xmlns:r="http://schemas.openxmlformats.org/officeDocument/2006/relationships" xmlns:p="http://schemas.openxmlformats.org/presentationml/2006/main">
   <p:cSld>
     <p:spTree>
@@ -4128,7 +5627,7 @@
         </p:nvSpPr>
         <p:spPr>
           <a:xfrm>
-            <a:off x="3316431" y="775676"/>
+            <a:off x="3383972" y="913428"/>
             <a:ext cx="5559137" cy="369332"/>
           </a:xfrm>
           <a:prstGeom prst="rect">
@@ -4186,7 +5685,7 @@
         </p:blipFill>
         <p:spPr>
           <a:xfrm>
-            <a:off x="2234866" y="1333452"/>
+            <a:off x="2302407" y="1471204"/>
             <a:ext cx="7208679" cy="5386796"/>
           </a:xfrm>
           <a:prstGeom prst="rect">
@@ -4210,7 +5709,7 @@
         </p:nvCxnSpPr>
         <p:spPr>
           <a:xfrm flipV="1">
-            <a:off x="4787462" y="1450428"/>
+            <a:off x="4855003" y="1588180"/>
             <a:ext cx="0" cy="4587765"/>
           </a:xfrm>
           <a:prstGeom prst="line">
@@ -4237,6 +5736,45 @@
           </a:fontRef>
         </p:style>
       </p:cxnSp>
+      <p:sp>
+        <p:nvSpPr>
+          <p:cNvPr id="6" name="TextBox 5">
+            <a:extLst>
+              <a:ext uri="{FF2B5EF4-FFF2-40B4-BE49-F238E27FC236}">
+                <a16:creationId xmlns:a16="http://schemas.microsoft.com/office/drawing/2014/main" id="{0CCC91D1-6952-317A-0561-A79DE86F7B22}"/>
+              </a:ext>
+            </a:extLst>
+          </p:cNvPr>
+          <p:cNvSpPr txBox="1"/>
+          <p:nvPr/>
+        </p:nvSpPr>
+        <p:spPr>
+          <a:xfrm>
+            <a:off x="678384" y="504825"/>
+            <a:ext cx="7400925" cy="461665"/>
+          </a:xfrm>
+          <a:prstGeom prst="rect">
+            <a:avLst/>
+          </a:prstGeom>
+          <a:noFill/>
+        </p:spPr>
+        <p:txBody>
+          <a:bodyPr wrap="square" rtlCol="0">
+            <a:spAutoFit/>
+          </a:bodyPr>
+          <a:lstStyle/>
+          <a:p>
+            <a:r>
+              <a:rPr lang="en-US" sz="2400" b="1" dirty="0">
+                <a:solidFill>
+                  <a:schemeClr val="accent1"/>
+                </a:solidFill>
+              </a:rPr>
+              <a:t>0D reactor with experimental data</a:t>
+            </a:r>
+          </a:p>
+        </p:txBody>
+      </p:sp>
     </p:spTree>
     <p:extLst>
       <p:ext uri="{BB962C8B-B14F-4D97-AF65-F5344CB8AC3E}">
@@ -4250,7 +5788,7 @@
 </p:sld>
 </file>
 
-<file path=ppt/slides/slide4.xml><?xml version="1.0" encoding="utf-8"?>
+<file path=ppt/slides/slide5.xml><?xml version="1.0" encoding="utf-8"?>
 <p:sld xmlns:a="http://schemas.openxmlformats.org/drawingml/2006/main" xmlns:r="http://schemas.openxmlformats.org/officeDocument/2006/relationships" xmlns:p="http://schemas.openxmlformats.org/presentationml/2006/main">
   <p:cSld>
     <p:spTree>
@@ -4287,7 +5825,7 @@
         </p:nvSpPr>
         <p:spPr>
           <a:xfrm>
-            <a:off x="3316431" y="775676"/>
+            <a:off x="3321626" y="949517"/>
             <a:ext cx="5559137" cy="369332"/>
           </a:xfrm>
           <a:prstGeom prst="rect">
@@ -4345,7 +5883,7 @@
         </p:blipFill>
         <p:spPr>
           <a:xfrm>
-            <a:off x="2145844" y="1190488"/>
+            <a:off x="2151039" y="1364329"/>
             <a:ext cx="7292446" cy="5493671"/>
           </a:xfrm>
           <a:prstGeom prst="rect">
@@ -4369,7 +5907,7 @@
         </p:nvCxnSpPr>
         <p:spPr>
           <a:xfrm flipV="1">
-            <a:off x="6043448" y="1298028"/>
+            <a:off x="6048643" y="1471869"/>
             <a:ext cx="0" cy="4719145"/>
           </a:xfrm>
           <a:prstGeom prst="line">
@@ -4396,6 +5934,45 @@
           </a:fontRef>
         </p:style>
       </p:cxnSp>
+      <p:sp>
+        <p:nvSpPr>
+          <p:cNvPr id="2" name="TextBox 1">
+            <a:extLst>
+              <a:ext uri="{FF2B5EF4-FFF2-40B4-BE49-F238E27FC236}">
+                <a16:creationId xmlns:a16="http://schemas.microsoft.com/office/drawing/2014/main" id="{528CF73A-6DA7-6126-6F8E-6E8E1F1B38D2}"/>
+              </a:ext>
+            </a:extLst>
+          </p:cNvPr>
+          <p:cNvSpPr txBox="1"/>
+          <p:nvPr/>
+        </p:nvSpPr>
+        <p:spPr>
+          <a:xfrm>
+            <a:off x="678384" y="504825"/>
+            <a:ext cx="7400925" cy="461665"/>
+          </a:xfrm>
+          <a:prstGeom prst="rect">
+            <a:avLst/>
+          </a:prstGeom>
+          <a:noFill/>
+        </p:spPr>
+        <p:txBody>
+          <a:bodyPr wrap="square" rtlCol="0">
+            <a:spAutoFit/>
+          </a:bodyPr>
+          <a:lstStyle/>
+          <a:p>
+            <a:r>
+              <a:rPr lang="en-US" sz="2400" b="1" dirty="0">
+                <a:solidFill>
+                  <a:schemeClr val="accent1"/>
+                </a:solidFill>
+              </a:rPr>
+              <a:t>0D reactor with experimental data</a:t>
+            </a:r>
+          </a:p>
+        </p:txBody>
+      </p:sp>
     </p:spTree>
     <p:extLst>
       <p:ext uri="{BB962C8B-B14F-4D97-AF65-F5344CB8AC3E}">
@@ -4409,7 +5986,7 @@
 </p:sld>
 </file>
 
-<file path=ppt/slides/slide5.xml><?xml version="1.0" encoding="utf-8"?>
+<file path=ppt/slides/slide6.xml><?xml version="1.0" encoding="utf-8"?>
 <p:sld xmlns:a="http://schemas.openxmlformats.org/drawingml/2006/main" xmlns:r="http://schemas.openxmlformats.org/officeDocument/2006/relationships" xmlns:p="http://schemas.openxmlformats.org/presentationml/2006/main">
   <p:cSld>
     <p:spTree>
@@ -4446,7 +6023,7 @@
         </p:nvSpPr>
         <p:spPr>
           <a:xfrm>
-            <a:off x="3316431" y="775676"/>
+            <a:off x="3326822" y="893559"/>
             <a:ext cx="5559137" cy="369332"/>
           </a:xfrm>
           <a:prstGeom prst="rect">
@@ -4504,7 +6081,7 @@
         </p:blipFill>
         <p:spPr>
           <a:xfrm>
-            <a:off x="2049096" y="1145008"/>
+            <a:off x="2059487" y="1262891"/>
             <a:ext cx="7552103" cy="5595109"/>
           </a:xfrm>
           <a:prstGeom prst="rect">
@@ -4528,7 +6105,7 @@
         </p:nvCxnSpPr>
         <p:spPr>
           <a:xfrm flipV="1">
-            <a:off x="6616263" y="1277007"/>
+            <a:off x="6626654" y="1394890"/>
             <a:ext cx="0" cy="4771697"/>
           </a:xfrm>
           <a:prstGeom prst="line">
@@ -4555,6 +6132,45 @@
           </a:fontRef>
         </p:style>
       </p:cxnSp>
+      <p:sp>
+        <p:nvSpPr>
+          <p:cNvPr id="3" name="TextBox 2">
+            <a:extLst>
+              <a:ext uri="{FF2B5EF4-FFF2-40B4-BE49-F238E27FC236}">
+                <a16:creationId xmlns:a16="http://schemas.microsoft.com/office/drawing/2014/main" id="{6642E439-C77E-54B7-7CE3-A5F5DDA74E71}"/>
+              </a:ext>
+            </a:extLst>
+          </p:cNvPr>
+          <p:cNvSpPr txBox="1"/>
+          <p:nvPr/>
+        </p:nvSpPr>
+        <p:spPr>
+          <a:xfrm>
+            <a:off x="678384" y="504825"/>
+            <a:ext cx="7400925" cy="461665"/>
+          </a:xfrm>
+          <a:prstGeom prst="rect">
+            <a:avLst/>
+          </a:prstGeom>
+          <a:noFill/>
+        </p:spPr>
+        <p:txBody>
+          <a:bodyPr wrap="square" rtlCol="0">
+            <a:spAutoFit/>
+          </a:bodyPr>
+          <a:lstStyle/>
+          <a:p>
+            <a:r>
+              <a:rPr lang="en-US" sz="2400" b="1" dirty="0">
+                <a:solidFill>
+                  <a:schemeClr val="accent1"/>
+                </a:solidFill>
+              </a:rPr>
+              <a:t>0D reactor with experimental data</a:t>
+            </a:r>
+          </a:p>
+        </p:txBody>
+      </p:sp>
     </p:spTree>
     <p:extLst>
       <p:ext uri="{BB962C8B-B14F-4D97-AF65-F5344CB8AC3E}">
@@ -4568,7 +6184,7 @@
 </p:sld>
 </file>
 
-<file path=ppt/slides/slide6.xml><?xml version="1.0" encoding="utf-8"?>
+<file path=ppt/slides/slide7.xml><?xml version="1.0" encoding="utf-8"?>
 <p:sld xmlns:a="http://schemas.openxmlformats.org/drawingml/2006/main" xmlns:r="http://schemas.openxmlformats.org/officeDocument/2006/relationships" xmlns:p="http://schemas.openxmlformats.org/presentationml/2006/main">
   <p:cSld>
     <p:spTree>
@@ -4619,7 +6235,7 @@
         </p:blipFill>
         <p:spPr>
           <a:xfrm>
-            <a:off x="266944" y="1060947"/>
+            <a:off x="801160" y="1126944"/>
             <a:ext cx="7687033" cy="5731056"/>
           </a:xfrm>
           <a:prstGeom prst="rect">
@@ -4641,7 +6257,7 @@
         </p:nvCxnSpPr>
         <p:spPr>
           <a:xfrm flipV="1">
-            <a:off x="4109545" y="1828800"/>
+            <a:off x="4644677" y="1911423"/>
             <a:ext cx="0" cy="4225159"/>
           </a:xfrm>
           <a:prstGeom prst="line">
@@ -4682,7 +6298,7 @@
         </p:nvCxnSpPr>
         <p:spPr>
           <a:xfrm flipV="1">
-            <a:off x="5822730" y="1858564"/>
+            <a:off x="6746745" y="1941188"/>
             <a:ext cx="0" cy="4225159"/>
           </a:xfrm>
           <a:prstGeom prst="line">
@@ -4723,7 +6339,7 @@
         </p:nvSpPr>
         <p:spPr>
           <a:xfrm>
-            <a:off x="1600200" y="644318"/>
+            <a:off x="2134416" y="710315"/>
             <a:ext cx="5559137" cy="369332"/>
           </a:xfrm>
           <a:prstGeom prst="rect">
@@ -4763,7 +6379,7 @@
         </p:nvSpPr>
         <p:spPr>
           <a:xfrm>
-            <a:off x="8099713" y="3049312"/>
+            <a:off x="8633929" y="3115309"/>
             <a:ext cx="3746993" cy="1754326"/>
           </a:xfrm>
           <a:prstGeom prst="rect">
@@ -4820,6 +6436,45 @@
               <a:buChar char="•"/>
             </a:pPr>
             <a:endParaRPr lang="en-US" dirty="0"/>
+          </a:p>
+        </p:txBody>
+      </p:sp>
+      <p:sp>
+        <p:nvSpPr>
+          <p:cNvPr id="2" name="TextBox 1">
+            <a:extLst>
+              <a:ext uri="{FF2B5EF4-FFF2-40B4-BE49-F238E27FC236}">
+                <a16:creationId xmlns:a16="http://schemas.microsoft.com/office/drawing/2014/main" id="{2931ACA2-9EC8-156E-BD40-213DE1397BBB}"/>
+              </a:ext>
+            </a:extLst>
+          </p:cNvPr>
+          <p:cNvSpPr txBox="1"/>
+          <p:nvPr/>
+        </p:nvSpPr>
+        <p:spPr>
+          <a:xfrm>
+            <a:off x="604812" y="288804"/>
+            <a:ext cx="7400925" cy="461665"/>
+          </a:xfrm>
+          <a:prstGeom prst="rect">
+            <a:avLst/>
+          </a:prstGeom>
+          <a:noFill/>
+        </p:spPr>
+        <p:txBody>
+          <a:bodyPr wrap="square" rtlCol="0">
+            <a:spAutoFit/>
+          </a:bodyPr>
+          <a:lstStyle/>
+          <a:p>
+            <a:r>
+              <a:rPr lang="en-US" sz="2400" b="1" dirty="0">
+                <a:solidFill>
+                  <a:schemeClr val="accent1"/>
+                </a:solidFill>
+              </a:rPr>
+              <a:t>0D reactor with surrogate model data</a:t>
+            </a:r>
           </a:p>
         </p:txBody>
       </p:sp>
@@ -4836,7 +6491,7 @@
 </p:sld>
 </file>
 
-<file path=ppt/slides/slide7.xml><?xml version="1.0" encoding="utf-8"?>
+<file path=ppt/slides/slide8.xml><?xml version="1.0" encoding="utf-8"?>
 <p:sld xmlns:a="http://schemas.openxmlformats.org/drawingml/2006/main" xmlns:r="http://schemas.openxmlformats.org/officeDocument/2006/relationships" xmlns:p="http://schemas.openxmlformats.org/presentationml/2006/main">
   <p:cSld>
     <p:spTree>
@@ -4844,7 +6499,7 @@
         <p:cNvPr id="1" name="">
           <a:extLst>
             <a:ext uri="{FF2B5EF4-FFF2-40B4-BE49-F238E27FC236}">
-              <a16:creationId xmlns:a16="http://schemas.microsoft.com/office/drawing/2014/main" id="{0898638E-D575-3189-0E36-03EE0D736765}"/>
+              <a16:creationId xmlns:a16="http://schemas.microsoft.com/office/drawing/2014/main" id="{9B73E33F-5A44-B18D-9384-DEDEBAA413AF}"/>
             </a:ext>
           </a:extLst>
         </p:cNvPr>
@@ -4859,10 +6514,822 @@
           <a:chExt cx="0" cy="0"/>
         </a:xfrm>
       </p:grpSpPr>
+      <p:sp>
+        <p:nvSpPr>
+          <p:cNvPr id="14" name="Rectangle 13">
+            <a:extLst>
+              <a:ext uri="{FF2B5EF4-FFF2-40B4-BE49-F238E27FC236}">
+                <a16:creationId xmlns:a16="http://schemas.microsoft.com/office/drawing/2014/main" id="{CFC95A5F-2909-E2E0-15E1-72D245D1B4AA}"/>
+              </a:ext>
+            </a:extLst>
+          </p:cNvPr>
+          <p:cNvSpPr/>
+          <p:nvPr/>
+        </p:nvSpPr>
+        <p:spPr>
+          <a:xfrm>
+            <a:off x="4240385" y="2789542"/>
+            <a:ext cx="3190009" cy="1143000"/>
+          </a:xfrm>
+          <a:prstGeom prst="rect">
+            <a:avLst/>
+          </a:prstGeom>
+          <a:solidFill>
+            <a:schemeClr val="tx2">
+              <a:lumMod val="25000"/>
+              <a:lumOff val="75000"/>
+            </a:schemeClr>
+          </a:solidFill>
+          <a:ln>
+            <a:solidFill>
+              <a:schemeClr val="tx1"/>
+            </a:solidFill>
+          </a:ln>
+        </p:spPr>
+        <p:style>
+          <a:lnRef idx="2">
+            <a:schemeClr val="accent1">
+              <a:shade val="15000"/>
+            </a:schemeClr>
+          </a:lnRef>
+          <a:fillRef idx="1">
+            <a:schemeClr val="accent1"/>
+          </a:fillRef>
+          <a:effectRef idx="0">
+            <a:schemeClr val="accent1"/>
+          </a:effectRef>
+          <a:fontRef idx="minor">
+            <a:schemeClr val="lt1"/>
+          </a:fontRef>
+        </p:style>
+        <p:txBody>
+          <a:bodyPr rtlCol="0" anchor="ctr"/>
+          <a:lstStyle/>
+          <a:p>
+            <a:pPr algn="ctr"/>
+            <a:r>
+              <a:rPr lang="en-US" dirty="0">
+                <a:solidFill>
+                  <a:schemeClr val="tx1"/>
+                </a:solidFill>
+              </a:rPr>
+              <a:t>OD reactor</a:t>
+            </a:r>
+          </a:p>
+        </p:txBody>
+      </p:sp>
+      <p:sp>
+        <p:nvSpPr>
+          <p:cNvPr id="15" name="TextBox 14">
+            <a:extLst>
+              <a:ext uri="{FF2B5EF4-FFF2-40B4-BE49-F238E27FC236}">
+                <a16:creationId xmlns:a16="http://schemas.microsoft.com/office/drawing/2014/main" id="{15063A73-20B3-E5E5-CA01-C68B28CC4B4E}"/>
+              </a:ext>
+            </a:extLst>
+          </p:cNvPr>
+          <p:cNvSpPr txBox="1"/>
+          <p:nvPr/>
+        </p:nvSpPr>
+        <p:spPr>
+          <a:xfrm>
+            <a:off x="3550688" y="1812796"/>
+            <a:ext cx="4569402" cy="369332"/>
+          </a:xfrm>
+          <a:prstGeom prst="rect">
+            <a:avLst/>
+          </a:prstGeom>
+          <a:noFill/>
+        </p:spPr>
+        <p:txBody>
+          <a:bodyPr wrap="square" rtlCol="0">
+            <a:spAutoFit/>
+          </a:bodyPr>
+          <a:lstStyle/>
+          <a:p>
+            <a:pPr algn="ctr"/>
+            <a:r>
+              <a:rPr lang="en-US" dirty="0"/>
+              <a:t>Mixture, </a:t>
+            </a:r>
+            <a:r>
+              <a:rPr lang="en-US" dirty="0" err="1"/>
+              <a:t>Tinlet</a:t>
+            </a:r>
+            <a:r>
+              <a:rPr lang="en-US" dirty="0"/>
+              <a:t>, </a:t>
+            </a:r>
+            <a:r>
+              <a:rPr lang="en-US" dirty="0" err="1"/>
+              <a:t>Tsurface</a:t>
+            </a:r>
+            <a:r>
+              <a:rPr lang="en-US" dirty="0"/>
+              <a:t>, </a:t>
+            </a:r>
+            <a:r>
+              <a:rPr lang="en-US" dirty="0" err="1"/>
+              <a:t>Pstat</a:t>
+            </a:r>
+            <a:r>
+              <a:rPr lang="en-US" dirty="0"/>
+              <a:t>, … </a:t>
+            </a:r>
+          </a:p>
+        </p:txBody>
+      </p:sp>
+      <p:cxnSp>
+        <p:nvCxnSpPr>
+          <p:cNvPr id="19" name="Straight Arrow Connector 18">
+            <a:extLst>
+              <a:ext uri="{FF2B5EF4-FFF2-40B4-BE49-F238E27FC236}">
+                <a16:creationId xmlns:a16="http://schemas.microsoft.com/office/drawing/2014/main" id="{971D2C2C-099C-BA6F-AC1D-03F4D0520511}"/>
+              </a:ext>
+            </a:extLst>
+          </p:cNvPr>
+          <p:cNvCxnSpPr>
+            <a:stCxn id="15" idx="2"/>
+            <a:endCxn id="14" idx="0"/>
+          </p:cNvCxnSpPr>
+          <p:nvPr/>
+        </p:nvCxnSpPr>
+        <p:spPr>
+          <a:xfrm>
+            <a:off x="5835389" y="2182128"/>
+            <a:ext cx="1" cy="607414"/>
+          </a:xfrm>
+          <a:prstGeom prst="straightConnector1">
+            <a:avLst/>
+          </a:prstGeom>
+          <a:ln>
+            <a:tailEnd type="triangle"/>
+          </a:ln>
+        </p:spPr>
+        <p:style>
+          <a:lnRef idx="2">
+            <a:schemeClr val="accent1"/>
+          </a:lnRef>
+          <a:fillRef idx="0">
+            <a:schemeClr val="accent1"/>
+          </a:fillRef>
+          <a:effectRef idx="1">
+            <a:schemeClr val="accent1"/>
+          </a:effectRef>
+          <a:fontRef idx="minor">
+            <a:schemeClr val="tx1"/>
+          </a:fontRef>
+        </p:style>
+      </p:cxnSp>
+      <p:pic>
+        <p:nvPicPr>
+          <p:cNvPr id="23" name="Picture 22" descr="A black symbols on a white background&#10;&#10;AI-generated content may be incorrect.">
+            <a:extLst>
+              <a:ext uri="{FF2B5EF4-FFF2-40B4-BE49-F238E27FC236}">
+                <a16:creationId xmlns:a16="http://schemas.microsoft.com/office/drawing/2014/main" id="{3FEF167F-7424-01CE-C4C4-5A3C0EA0E7C1}"/>
+              </a:ext>
+            </a:extLst>
+          </p:cNvPr>
+          <p:cNvPicPr>
+            <a:picLocks noChangeAspect="1"/>
+          </p:cNvPicPr>
+          <p:nvPr/>
+        </p:nvPicPr>
+        <p:blipFill>
+          <a:blip r:embed="rId2">
+            <a:extLst>
+              <a:ext uri="{28A0092B-C50C-407E-A947-70E740481C1C}">
+                <a14:useLocalDpi xmlns:a14="http://schemas.microsoft.com/office/drawing/2010/main" val="0"/>
+              </a:ext>
+            </a:extLst>
+          </a:blip>
+          <a:stretch>
+            <a:fillRect/>
+          </a:stretch>
+        </p:blipFill>
+        <p:spPr>
+          <a:xfrm>
+            <a:off x="2715359" y="5279394"/>
+            <a:ext cx="3411914" cy="1062200"/>
+          </a:xfrm>
+          <a:prstGeom prst="rect">
+            <a:avLst/>
+          </a:prstGeom>
+        </p:spPr>
+      </p:pic>
+      <p:pic>
+        <p:nvPicPr>
+          <p:cNvPr id="25" name="Picture 24" descr="A black and white math equations&#10;&#10;AI-generated content may be incorrect.">
+            <a:extLst>
+              <a:ext uri="{FF2B5EF4-FFF2-40B4-BE49-F238E27FC236}">
+                <a16:creationId xmlns:a16="http://schemas.microsoft.com/office/drawing/2014/main" id="{BEA6EAD2-0E00-2FE9-0856-AC48E9650079}"/>
+              </a:ext>
+            </a:extLst>
+          </p:cNvPr>
+          <p:cNvPicPr>
+            <a:picLocks noChangeAspect="1"/>
+          </p:cNvPicPr>
+          <p:nvPr/>
+        </p:nvPicPr>
+        <p:blipFill>
+          <a:blip r:embed="rId3">
+            <a:extLst>
+              <a:ext uri="{28A0092B-C50C-407E-A947-70E740481C1C}">
+                <a14:useLocalDpi xmlns:a14="http://schemas.microsoft.com/office/drawing/2010/main" val="0"/>
+              </a:ext>
+            </a:extLst>
+          </a:blip>
+          <a:stretch>
+            <a:fillRect/>
+          </a:stretch>
+        </p:blipFill>
+        <p:spPr>
+          <a:xfrm>
+            <a:off x="6221273" y="5107171"/>
+            <a:ext cx="2418242" cy="1406645"/>
+          </a:xfrm>
+          <a:prstGeom prst="rect">
+            <a:avLst/>
+          </a:prstGeom>
+        </p:spPr>
+      </p:pic>
+      <p:cxnSp>
+        <p:nvCxnSpPr>
+          <p:cNvPr id="27" name="Straight Arrow Connector 26">
+            <a:extLst>
+              <a:ext uri="{FF2B5EF4-FFF2-40B4-BE49-F238E27FC236}">
+                <a16:creationId xmlns:a16="http://schemas.microsoft.com/office/drawing/2014/main" id="{D8D6D2B5-71C7-0AC9-5D42-60EC7AF18E10}"/>
+              </a:ext>
+            </a:extLst>
+          </p:cNvPr>
+          <p:cNvCxnSpPr>
+            <a:cxnSpLocks/>
+          </p:cNvCxnSpPr>
+          <p:nvPr/>
+        </p:nvCxnSpPr>
+        <p:spPr>
+          <a:xfrm flipV="1">
+            <a:off x="7995277" y="5383758"/>
+            <a:ext cx="930500" cy="298786"/>
+          </a:xfrm>
+          <a:prstGeom prst="straightConnector1">
+            <a:avLst/>
+          </a:prstGeom>
+          <a:ln>
+            <a:tailEnd type="triangle"/>
+          </a:ln>
+        </p:spPr>
+        <p:style>
+          <a:lnRef idx="2">
+            <a:schemeClr val="accent1"/>
+          </a:lnRef>
+          <a:fillRef idx="0">
+            <a:schemeClr val="accent1"/>
+          </a:fillRef>
+          <a:effectRef idx="1">
+            <a:schemeClr val="accent1"/>
+          </a:effectRef>
+          <a:fontRef idx="minor">
+            <a:schemeClr val="tx1"/>
+          </a:fontRef>
+        </p:style>
+      </p:cxnSp>
+      <p:sp>
+        <p:nvSpPr>
+          <p:cNvPr id="29" name="TextBox 28">
+            <a:extLst>
+              <a:ext uri="{FF2B5EF4-FFF2-40B4-BE49-F238E27FC236}">
+                <a16:creationId xmlns:a16="http://schemas.microsoft.com/office/drawing/2014/main" id="{0F04BE89-5A05-747F-91B0-A8D6BDAE0664}"/>
+              </a:ext>
+            </a:extLst>
+          </p:cNvPr>
+          <p:cNvSpPr txBox="1"/>
+          <p:nvPr/>
+        </p:nvSpPr>
+        <p:spPr>
+          <a:xfrm>
+            <a:off x="8988122" y="5199092"/>
+            <a:ext cx="2873996" cy="369332"/>
+          </a:xfrm>
+          <a:prstGeom prst="rect">
+            <a:avLst/>
+          </a:prstGeom>
+          <a:noFill/>
+        </p:spPr>
+        <p:txBody>
+          <a:bodyPr wrap="square" rtlCol="0">
+            <a:spAutoFit/>
+          </a:bodyPr>
+          <a:lstStyle/>
+          <a:p>
+            <a:r>
+              <a:rPr lang="en-US" dirty="0"/>
+              <a:t>What to impose for dx</a:t>
+            </a:r>
+          </a:p>
+        </p:txBody>
+      </p:sp>
+      <p:cxnSp>
+        <p:nvCxnSpPr>
+          <p:cNvPr id="31" name="Straight Arrow Connector 30">
+            <a:extLst>
+              <a:ext uri="{FF2B5EF4-FFF2-40B4-BE49-F238E27FC236}">
+                <a16:creationId xmlns:a16="http://schemas.microsoft.com/office/drawing/2014/main" id="{57FBA365-38B4-E18A-2E4B-4E04C1539BB2}"/>
+              </a:ext>
+            </a:extLst>
+          </p:cNvPr>
+          <p:cNvCxnSpPr>
+            <a:cxnSpLocks/>
+          </p:cNvCxnSpPr>
+          <p:nvPr/>
+        </p:nvCxnSpPr>
+        <p:spPr>
+          <a:xfrm flipV="1">
+            <a:off x="7803015" y="5517155"/>
+            <a:ext cx="1122762" cy="824439"/>
+          </a:xfrm>
+          <a:prstGeom prst="straightConnector1">
+            <a:avLst/>
+          </a:prstGeom>
+          <a:ln>
+            <a:tailEnd type="triangle"/>
+          </a:ln>
+        </p:spPr>
+        <p:style>
+          <a:lnRef idx="2">
+            <a:schemeClr val="accent1"/>
+          </a:lnRef>
+          <a:fillRef idx="0">
+            <a:schemeClr val="accent1"/>
+          </a:fillRef>
+          <a:effectRef idx="1">
+            <a:schemeClr val="accent1"/>
+          </a:effectRef>
+          <a:fontRef idx="minor">
+            <a:schemeClr val="tx1"/>
+          </a:fontRef>
+        </p:style>
+      </p:cxnSp>
+      <p:sp>
+        <p:nvSpPr>
+          <p:cNvPr id="34" name="Rectangle 33">
+            <a:extLst>
+              <a:ext uri="{FF2B5EF4-FFF2-40B4-BE49-F238E27FC236}">
+                <a16:creationId xmlns:a16="http://schemas.microsoft.com/office/drawing/2014/main" id="{FCB8FD80-33A9-6B9F-40B1-981F077DFE32}"/>
+              </a:ext>
+            </a:extLst>
+          </p:cNvPr>
+          <p:cNvSpPr/>
+          <p:nvPr/>
+        </p:nvSpPr>
+        <p:spPr>
+          <a:xfrm>
+            <a:off x="8988122" y="5199092"/>
+            <a:ext cx="2728523" cy="369332"/>
+          </a:xfrm>
+          <a:prstGeom prst="rect">
+            <a:avLst/>
+          </a:prstGeom>
+          <a:noFill/>
+          <a:ln>
+            <a:solidFill>
+              <a:srgbClr val="FF0000"/>
+            </a:solidFill>
+          </a:ln>
+        </p:spPr>
+        <p:style>
+          <a:lnRef idx="2">
+            <a:schemeClr val="accent1">
+              <a:shade val="15000"/>
+            </a:schemeClr>
+          </a:lnRef>
+          <a:fillRef idx="1">
+            <a:schemeClr val="accent1"/>
+          </a:fillRef>
+          <a:effectRef idx="0">
+            <a:schemeClr val="accent1"/>
+          </a:effectRef>
+          <a:fontRef idx="minor">
+            <a:schemeClr val="lt1"/>
+          </a:fontRef>
+        </p:style>
+        <p:txBody>
+          <a:bodyPr rtlCol="0" anchor="ctr"/>
+          <a:lstStyle/>
+          <a:p>
+            <a:pPr algn="ctr"/>
+            <a:endParaRPr lang="en-US"/>
+          </a:p>
+        </p:txBody>
+      </p:sp>
+      <p:cxnSp>
+        <p:nvCxnSpPr>
+          <p:cNvPr id="2" name="Straight Arrow Connector 1">
+            <a:extLst>
+              <a:ext uri="{FF2B5EF4-FFF2-40B4-BE49-F238E27FC236}">
+                <a16:creationId xmlns:a16="http://schemas.microsoft.com/office/drawing/2014/main" id="{C70ABE01-EC5A-24F7-FD9A-056AB3CD98EE}"/>
+              </a:ext>
+            </a:extLst>
+          </p:cNvPr>
+          <p:cNvCxnSpPr>
+            <a:cxnSpLocks/>
+            <a:stCxn id="14" idx="2"/>
+          </p:cNvCxnSpPr>
+          <p:nvPr/>
+        </p:nvCxnSpPr>
+        <p:spPr>
+          <a:xfrm>
+            <a:off x="5835390" y="3932542"/>
+            <a:ext cx="0" cy="1058917"/>
+          </a:xfrm>
+          <a:prstGeom prst="straightConnector1">
+            <a:avLst/>
+          </a:prstGeom>
+          <a:ln>
+            <a:tailEnd type="triangle"/>
+          </a:ln>
+        </p:spPr>
+        <p:style>
+          <a:lnRef idx="2">
+            <a:schemeClr val="accent1"/>
+          </a:lnRef>
+          <a:fillRef idx="0">
+            <a:schemeClr val="accent1"/>
+          </a:fillRef>
+          <a:effectRef idx="1">
+            <a:schemeClr val="accent1"/>
+          </a:effectRef>
+          <a:fontRef idx="minor">
+            <a:schemeClr val="tx1"/>
+          </a:fontRef>
+        </p:style>
+      </p:cxnSp>
+      <p:sp>
+        <p:nvSpPr>
+          <p:cNvPr id="4" name="TextBox 3">
+            <a:extLst>
+              <a:ext uri="{FF2B5EF4-FFF2-40B4-BE49-F238E27FC236}">
+                <a16:creationId xmlns:a16="http://schemas.microsoft.com/office/drawing/2014/main" id="{378A53D1-FBC1-2F30-B436-FC09832A817F}"/>
+              </a:ext>
+            </a:extLst>
+          </p:cNvPr>
+          <p:cNvSpPr txBox="1"/>
+          <p:nvPr/>
+        </p:nvSpPr>
+        <p:spPr>
+          <a:xfrm>
+            <a:off x="678384" y="504825"/>
+            <a:ext cx="7400925" cy="461665"/>
+          </a:xfrm>
+          <a:prstGeom prst="rect">
+            <a:avLst/>
+          </a:prstGeom>
+          <a:noFill/>
+        </p:spPr>
+        <p:txBody>
+          <a:bodyPr wrap="square" rtlCol="0">
+            <a:spAutoFit/>
+          </a:bodyPr>
+          <a:lstStyle/>
+          <a:p>
+            <a:r>
+              <a:rPr lang="en-US" sz="2400" b="1" dirty="0">
+                <a:solidFill>
+                  <a:schemeClr val="accent1"/>
+                </a:solidFill>
+              </a:rPr>
+              <a:t>0D reactor with surrogate model data </a:t>
+            </a:r>
+          </a:p>
+        </p:txBody>
+      </p:sp>
     </p:spTree>
     <p:extLst>
       <p:ext uri="{BB962C8B-B14F-4D97-AF65-F5344CB8AC3E}">
-        <p14:creationId xmlns:p14="http://schemas.microsoft.com/office/powerpoint/2010/main" val="2495170865"/>
+        <p14:creationId xmlns:p14="http://schemas.microsoft.com/office/powerpoint/2010/main" val="1957673470"/>
+      </p:ext>
+    </p:extLst>
+  </p:cSld>
+  <p:clrMapOvr>
+    <a:masterClrMapping/>
+  </p:clrMapOvr>
+</p:sld>
+</file>
+
+<file path=ppt/slides/slide9.xml><?xml version="1.0" encoding="utf-8"?>
+<p:sld xmlns:a="http://schemas.openxmlformats.org/drawingml/2006/main" xmlns:r="http://schemas.openxmlformats.org/officeDocument/2006/relationships" xmlns:p="http://schemas.openxmlformats.org/presentationml/2006/main">
+  <p:cSld>
+    <p:spTree>
+      <p:nvGrpSpPr>
+        <p:cNvPr id="1" name="">
+          <a:extLst>
+            <a:ext uri="{FF2B5EF4-FFF2-40B4-BE49-F238E27FC236}">
+              <a16:creationId xmlns:a16="http://schemas.microsoft.com/office/drawing/2014/main" id="{8DA703C2-5D55-B3A5-3289-9E0D8FC85590}"/>
+            </a:ext>
+          </a:extLst>
+        </p:cNvPr>
+        <p:cNvGrpSpPr/>
+        <p:nvPr/>
+      </p:nvGrpSpPr>
+      <p:grpSpPr>
+        <a:xfrm>
+          <a:off x="0" y="0"/>
+          <a:ext cx="0" cy="0"/>
+          <a:chOff x="0" y="0"/>
+          <a:chExt cx="0" cy="0"/>
+        </a:xfrm>
+      </p:grpSpPr>
+      <p:sp>
+        <p:nvSpPr>
+          <p:cNvPr id="3" name="TextBox 2">
+            <a:extLst>
+              <a:ext uri="{FF2B5EF4-FFF2-40B4-BE49-F238E27FC236}">
+                <a16:creationId xmlns:a16="http://schemas.microsoft.com/office/drawing/2014/main" id="{065FDD96-7E8F-2F90-0A93-EBCCB1DA195D}"/>
+              </a:ext>
+            </a:extLst>
+          </p:cNvPr>
+          <p:cNvSpPr txBox="1"/>
+          <p:nvPr/>
+        </p:nvSpPr>
+        <p:spPr>
+          <a:xfrm>
+            <a:off x="758537" y="1387186"/>
+            <a:ext cx="5699413" cy="5078313"/>
+          </a:xfrm>
+          <a:prstGeom prst="rect">
+            <a:avLst/>
+          </a:prstGeom>
+          <a:noFill/>
+        </p:spPr>
+        <p:txBody>
+          <a:bodyPr wrap="square" rtlCol="0">
+            <a:spAutoFit/>
+          </a:bodyPr>
+          <a:lstStyle/>
+          <a:p>
+            <a:r>
+              <a:rPr lang="en-US" b="1" u="sng" dirty="0"/>
+              <a:t>Separate values for </a:t>
+            </a:r>
+            <a:r>
+              <a:rPr lang="en-US" b="1" u="sng" dirty="0" err="1"/>
+              <a:t>dx_diff</a:t>
+            </a:r>
+            <a:r>
+              <a:rPr lang="en-US" b="1" u="sng" dirty="0"/>
+              <a:t> and </a:t>
+            </a:r>
+            <a:r>
+              <a:rPr lang="en-US" b="1" u="sng" dirty="0" err="1"/>
+              <a:t>dx_conv</a:t>
+            </a:r>
+            <a:r>
+              <a:rPr lang="en-US" b="1" u="sng" dirty="0"/>
+              <a:t>:</a:t>
+            </a:r>
+          </a:p>
+          <a:p>
+            <a:endParaRPr lang="en-US" dirty="0"/>
+          </a:p>
+          <a:p>
+            <a:pPr marL="285750" indent="-285750">
+              <a:buFont typeface="Arial" panose="020B0604020202020204" pitchFamily="34" charset="0"/>
+              <a:buChar char="•"/>
+            </a:pPr>
+            <a:r>
+              <a:rPr lang="en-US" dirty="0"/>
+              <a:t> Very chaotic behavior for </a:t>
+            </a:r>
+            <a:r>
+              <a:rPr lang="en-US" dirty="0" err="1"/>
+              <a:t>dx_diff</a:t>
+            </a:r>
+            <a:r>
+              <a:rPr lang="en-US" dirty="0"/>
+              <a:t>     </a:t>
+            </a:r>
+            <a:r>
+              <a:rPr lang="en-US" dirty="0">
+                <a:sym typeface="Wingdings" panose="05000000000000000000" pitchFamily="2" charset="2"/>
+              </a:rPr>
+              <a:t>    Seems to be very dependent on the flow state (mass fraction)</a:t>
+            </a:r>
+          </a:p>
+          <a:p>
+            <a:pPr marL="285750" indent="-285750">
+              <a:buFont typeface="Arial" panose="020B0604020202020204" pitchFamily="34" charset="0"/>
+              <a:buChar char="•"/>
+            </a:pPr>
+            <a:endParaRPr lang="en-US" dirty="0">
+              <a:sym typeface="Wingdings" panose="05000000000000000000" pitchFamily="2" charset="2"/>
+            </a:endParaRPr>
+          </a:p>
+          <a:p>
+            <a:pPr marL="285750" indent="-285750">
+              <a:buFont typeface="Arial" panose="020B0604020202020204" pitchFamily="34" charset="0"/>
+              <a:buChar char="•"/>
+            </a:pPr>
+            <a:r>
+              <a:rPr lang="en-US" dirty="0">
+                <a:sym typeface="Wingdings" panose="05000000000000000000" pitchFamily="2" charset="2"/>
+              </a:rPr>
+              <a:t>No pattern could be found</a:t>
+            </a:r>
+          </a:p>
+          <a:p>
+            <a:pPr marL="285750" indent="-285750">
+              <a:buFont typeface="Arial" panose="020B0604020202020204" pitchFamily="34" charset="0"/>
+              <a:buChar char="•"/>
+            </a:pPr>
+            <a:endParaRPr lang="en-US" dirty="0">
+              <a:sym typeface="Wingdings" panose="05000000000000000000" pitchFamily="2" charset="2"/>
+            </a:endParaRPr>
+          </a:p>
+          <a:p>
+            <a:pPr marL="285750" indent="-285750">
+              <a:buFont typeface="Arial" panose="020B0604020202020204" pitchFamily="34" charset="0"/>
+              <a:buChar char="•"/>
+            </a:pPr>
+            <a:endParaRPr lang="en-US" dirty="0">
+              <a:sym typeface="Wingdings" panose="05000000000000000000" pitchFamily="2" charset="2"/>
+            </a:endParaRPr>
+          </a:p>
+          <a:p>
+            <a:r>
+              <a:rPr lang="en-US" b="1" u="sng" dirty="0"/>
+              <a:t>Same values for </a:t>
+            </a:r>
+            <a:r>
+              <a:rPr lang="en-US" b="1" u="sng" dirty="0" err="1"/>
+              <a:t>dx_diff</a:t>
+            </a:r>
+            <a:r>
+              <a:rPr lang="en-US" b="1" u="sng" dirty="0"/>
+              <a:t> and </a:t>
+            </a:r>
+            <a:r>
+              <a:rPr lang="en-US" b="1" u="sng" dirty="0" err="1"/>
+              <a:t>dx_conv</a:t>
+            </a:r>
+            <a:r>
+              <a:rPr lang="en-US" b="1" u="sng" dirty="0"/>
+              <a:t>:</a:t>
+            </a:r>
+          </a:p>
+          <a:p>
+            <a:endParaRPr lang="en-US" dirty="0"/>
+          </a:p>
+          <a:p>
+            <a:pPr marL="285750" indent="-285750">
+              <a:buFont typeface="Arial" panose="020B0604020202020204" pitchFamily="34" charset="0"/>
+              <a:buChar char="•"/>
+            </a:pPr>
+            <a:r>
+              <a:rPr lang="en-US" dirty="0"/>
+              <a:t>Less chaotic but same observations ! </a:t>
+            </a:r>
+          </a:p>
+          <a:p>
+            <a:pPr marL="285750" indent="-285750">
+              <a:buFont typeface="Arial" panose="020B0604020202020204" pitchFamily="34" charset="0"/>
+              <a:buChar char="•"/>
+            </a:pPr>
+            <a:endParaRPr lang="en-US" dirty="0"/>
+          </a:p>
+          <a:p>
+            <a:pPr marL="285750" indent="-285750">
+              <a:buFont typeface="Arial" panose="020B0604020202020204" pitchFamily="34" charset="0"/>
+              <a:buChar char="•"/>
+            </a:pPr>
+            <a:r>
+              <a:rPr lang="en-US" dirty="0"/>
+              <a:t>The chaotic variation of </a:t>
+            </a:r>
+            <a:r>
+              <a:rPr lang="en-US" dirty="0" err="1"/>
+              <a:t>dx_diff</a:t>
+            </a:r>
+            <a:r>
+              <a:rPr lang="en-US" dirty="0"/>
+              <a:t> is influencing a lot the common value for both dx</a:t>
+            </a:r>
+          </a:p>
+          <a:p>
+            <a:endParaRPr lang="en-US" dirty="0"/>
+          </a:p>
+          <a:p>
+            <a:endParaRPr lang="en-US" dirty="0"/>
+          </a:p>
+          <a:p>
+            <a:endParaRPr lang="en-US" dirty="0"/>
+          </a:p>
+          <a:p>
+            <a:r>
+              <a:rPr lang="en-US" dirty="0">
+                <a:sym typeface="Wingdings" panose="05000000000000000000" pitchFamily="2" charset="2"/>
+              </a:rPr>
+              <a:t>  Solution: Impose </a:t>
+            </a:r>
+            <a:r>
+              <a:rPr lang="en-US" dirty="0" err="1">
+                <a:sym typeface="Wingdings" panose="05000000000000000000" pitchFamily="2" charset="2"/>
+              </a:rPr>
+              <a:t>dx_diff</a:t>
+            </a:r>
+            <a:r>
+              <a:rPr lang="en-US" dirty="0">
+                <a:sym typeface="Wingdings" panose="05000000000000000000" pitchFamily="2" charset="2"/>
+              </a:rPr>
+              <a:t> to 1e-3 and tune </a:t>
+            </a:r>
+            <a:r>
+              <a:rPr lang="en-US" dirty="0" err="1">
+                <a:sym typeface="Wingdings" panose="05000000000000000000" pitchFamily="2" charset="2"/>
+              </a:rPr>
+              <a:t>dx_conv</a:t>
+            </a:r>
+            <a:endParaRPr lang="en-US" dirty="0"/>
+          </a:p>
+        </p:txBody>
+      </p:sp>
+      <p:sp>
+        <p:nvSpPr>
+          <p:cNvPr id="4" name="TextBox 3">
+            <a:extLst>
+              <a:ext uri="{FF2B5EF4-FFF2-40B4-BE49-F238E27FC236}">
+                <a16:creationId xmlns:a16="http://schemas.microsoft.com/office/drawing/2014/main" id="{B248B126-5618-7010-8233-DE802E53C7C9}"/>
+              </a:ext>
+            </a:extLst>
+          </p:cNvPr>
+          <p:cNvSpPr txBox="1"/>
+          <p:nvPr/>
+        </p:nvSpPr>
+        <p:spPr>
+          <a:xfrm>
+            <a:off x="678384" y="504825"/>
+            <a:ext cx="7400925" cy="461665"/>
+          </a:xfrm>
+          <a:prstGeom prst="rect">
+            <a:avLst/>
+          </a:prstGeom>
+          <a:noFill/>
+        </p:spPr>
+        <p:txBody>
+          <a:bodyPr wrap="square" rtlCol="0">
+            <a:spAutoFit/>
+          </a:bodyPr>
+          <a:lstStyle/>
+          <a:p>
+            <a:r>
+              <a:rPr lang="en-US" sz="2400" b="1" dirty="0">
+                <a:solidFill>
+                  <a:schemeClr val="accent1"/>
+                </a:solidFill>
+              </a:rPr>
+              <a:t>0D reactor with experimental data</a:t>
+            </a:r>
+          </a:p>
+        </p:txBody>
+      </p:sp>
+      <p:pic>
+        <p:nvPicPr>
+          <p:cNvPr id="9" name="Picture 8" descr="A graph of blue dots&#10;&#10;AI-generated content may be incorrect.">
+            <a:extLst>
+              <a:ext uri="{FF2B5EF4-FFF2-40B4-BE49-F238E27FC236}">
+                <a16:creationId xmlns:a16="http://schemas.microsoft.com/office/drawing/2014/main" id="{D862C5DC-97D5-5FA7-3130-7E72F18CF9BC}"/>
+              </a:ext>
+            </a:extLst>
+          </p:cNvPr>
+          <p:cNvPicPr>
+            <a:picLocks noChangeAspect="1"/>
+          </p:cNvPicPr>
+          <p:nvPr/>
+        </p:nvPicPr>
+        <p:blipFill>
+          <a:blip r:embed="rId2">
+            <a:extLst>
+              <a:ext uri="{28A0092B-C50C-407E-A947-70E740481C1C}">
+                <a14:useLocalDpi xmlns:a14="http://schemas.microsoft.com/office/drawing/2010/main" val="0"/>
+              </a:ext>
+            </a:extLst>
+          </a:blip>
+          <a:stretch>
+            <a:fillRect/>
+          </a:stretch>
+        </p:blipFill>
+        <p:spPr>
+          <a:xfrm>
+            <a:off x="6938495" y="1188199"/>
+            <a:ext cx="4808428" cy="4787612"/>
+          </a:xfrm>
+          <a:prstGeom prst="rect">
+            <a:avLst/>
+          </a:prstGeom>
+        </p:spPr>
+      </p:pic>
+    </p:spTree>
+    <p:extLst>
+      <p:ext uri="{BB962C8B-B14F-4D97-AF65-F5344CB8AC3E}">
+        <p14:creationId xmlns:p14="http://schemas.microsoft.com/office/powerpoint/2010/main" val="70516025"/>
       </p:ext>
     </p:extLst>
   </p:cSld>
@@ -5185,4 +7652,319 @@
     </a:ext>
   </a:extLst>
 </a:theme>
+</file>
+
+<file path=ppt/theme/theme2.xml><?xml version="1.0" encoding="utf-8"?>
+<a:theme xmlns:a="http://schemas.openxmlformats.org/drawingml/2006/main" name="Office Theme">
+  <a:themeElements>
+    <a:clrScheme name="Office">
+      <a:dk1>
+        <a:sysClr val="windowText" lastClr="000000"/>
+      </a:dk1>
+      <a:lt1>
+        <a:sysClr val="window" lastClr="FFFFFF"/>
+      </a:lt1>
+      <a:dk2>
+        <a:srgbClr val="0E2841"/>
+      </a:dk2>
+      <a:lt2>
+        <a:srgbClr val="E8E8E8"/>
+      </a:lt2>
+      <a:accent1>
+        <a:srgbClr val="156082"/>
+      </a:accent1>
+      <a:accent2>
+        <a:srgbClr val="E97132"/>
+      </a:accent2>
+      <a:accent3>
+        <a:srgbClr val="196B24"/>
+      </a:accent3>
+      <a:accent4>
+        <a:srgbClr val="0F9ED5"/>
+      </a:accent4>
+      <a:accent5>
+        <a:srgbClr val="A02B93"/>
+      </a:accent5>
+      <a:accent6>
+        <a:srgbClr val="4EA72E"/>
+      </a:accent6>
+      <a:hlink>
+        <a:srgbClr val="467886"/>
+      </a:hlink>
+      <a:folHlink>
+        <a:srgbClr val="96607D"/>
+      </a:folHlink>
+    </a:clrScheme>
+    <a:fontScheme name="Office">
+      <a:majorFont>
+        <a:latin typeface="Aptos Display" panose="02110004020202020204"/>
+        <a:ea typeface=""/>
+        <a:cs typeface=""/>
+        <a:font script="Jpan" typeface="游ゴシック Light"/>
+        <a:font script="Hang" typeface="맑은 고딕"/>
+        <a:font script="Hans" typeface="等线 Light"/>
+        <a:font script="Hant" typeface="新細明體"/>
+        <a:font script="Arab" typeface="Times New Roman"/>
+        <a:font script="Hebr" typeface="Times New Roman"/>
+        <a:font script="Thai" typeface="Angsana New"/>
+        <a:font script="Ethi" typeface="Nyala"/>
+        <a:font script="Beng" typeface="Vrinda"/>
+        <a:font script="Gujr" typeface="Shruti"/>
+        <a:font script="Khmr" typeface="MoolBoran"/>
+        <a:font script="Knda" typeface="Tunga"/>
+        <a:font script="Guru" typeface="Raavi"/>
+        <a:font script="Cans" typeface="Euphemia"/>
+        <a:font script="Cher" typeface="Plantagenet Cherokee"/>
+        <a:font script="Yiii" typeface="Microsoft Yi Baiti"/>
+        <a:font script="Tibt" typeface="Microsoft Himalaya"/>
+        <a:font script="Thaa" typeface="MV Boli"/>
+        <a:font script="Deva" typeface="Mangal"/>
+        <a:font script="Telu" typeface="Gautami"/>
+        <a:font script="Taml" typeface="Latha"/>
+        <a:font script="Syrc" typeface="Estrangelo Edessa"/>
+        <a:font script="Orya" typeface="Kalinga"/>
+        <a:font script="Mlym" typeface="Kartika"/>
+        <a:font script="Laoo" typeface="DokChampa"/>
+        <a:font script="Sinh" typeface="Iskoola Pota"/>
+        <a:font script="Mong" typeface="Mongolian Baiti"/>
+        <a:font script="Viet" typeface="Times New Roman"/>
+        <a:font script="Uigh" typeface="Microsoft Uighur"/>
+        <a:font script="Geor" typeface="Sylfaen"/>
+        <a:font script="Armn" typeface="Arial"/>
+        <a:font script="Bugi" typeface="Leelawadee UI"/>
+        <a:font script="Bopo" typeface="Microsoft JhengHei"/>
+        <a:font script="Java" typeface="Javanese Text"/>
+        <a:font script="Lisu" typeface="Segoe UI"/>
+        <a:font script="Mymr" typeface="Myanmar Text"/>
+        <a:font script="Nkoo" typeface="Ebrima"/>
+        <a:font script="Olck" typeface="Nirmala UI"/>
+        <a:font script="Osma" typeface="Ebrima"/>
+        <a:font script="Phag" typeface="Phagspa"/>
+        <a:font script="Syrn" typeface="Estrangelo Edessa"/>
+        <a:font script="Syrj" typeface="Estrangelo Edessa"/>
+        <a:font script="Syre" typeface="Estrangelo Edessa"/>
+        <a:font script="Sora" typeface="Nirmala UI"/>
+        <a:font script="Tale" typeface="Microsoft Tai Le"/>
+        <a:font script="Talu" typeface="Microsoft New Tai Lue"/>
+        <a:font script="Tfng" typeface="Ebrima"/>
+      </a:majorFont>
+      <a:minorFont>
+        <a:latin typeface="Aptos" panose="02110004020202020204"/>
+        <a:ea typeface=""/>
+        <a:cs typeface=""/>
+        <a:font script="Jpan" typeface="游ゴシック"/>
+        <a:font script="Hang" typeface="맑은 고딕"/>
+        <a:font script="Hans" typeface="等线"/>
+        <a:font script="Hant" typeface="新細明體"/>
+        <a:font script="Arab" typeface="Arial"/>
+        <a:font script="Hebr" typeface="Arial"/>
+        <a:font script="Thai" typeface="Cordia New"/>
+        <a:font script="Ethi" typeface="Nyala"/>
+        <a:font script="Beng" typeface="Vrinda"/>
+        <a:font script="Gujr" typeface="Shruti"/>
+        <a:font script="Khmr" typeface="DaunPenh"/>
+        <a:font script="Knda" typeface="Tunga"/>
+        <a:font script="Guru" typeface="Raavi"/>
+        <a:font script="Cans" typeface="Euphemia"/>
+        <a:font script="Cher" typeface="Plantagenet Cherokee"/>
+        <a:font script="Yiii" typeface="Microsoft Yi Baiti"/>
+        <a:font script="Tibt" typeface="Microsoft Himalaya"/>
+        <a:font script="Thaa" typeface="MV Boli"/>
+        <a:font script="Deva" typeface="Mangal"/>
+        <a:font script="Telu" typeface="Gautami"/>
+        <a:font script="Taml" typeface="Latha"/>
+        <a:font script="Syrc" typeface="Estrangelo Edessa"/>
+        <a:font script="Orya" typeface="Kalinga"/>
+        <a:font script="Mlym" typeface="Kartika"/>
+        <a:font script="Laoo" typeface="DokChampa"/>
+        <a:font script="Sinh" typeface="Iskoola Pota"/>
+        <a:font script="Mong" typeface="Mongolian Baiti"/>
+        <a:font script="Viet" typeface="Arial"/>
+        <a:font script="Uigh" typeface="Microsoft Uighur"/>
+        <a:font script="Geor" typeface="Sylfaen"/>
+        <a:font script="Armn" typeface="Arial"/>
+        <a:font script="Bugi" typeface="Leelawadee UI"/>
+        <a:font script="Bopo" typeface="Microsoft JhengHei"/>
+        <a:font script="Java" typeface="Javanese Text"/>
+        <a:font script="Lisu" typeface="Segoe UI"/>
+        <a:font script="Mymr" typeface="Myanmar Text"/>
+        <a:font script="Nkoo" typeface="Ebrima"/>
+        <a:font script="Olck" typeface="Nirmala UI"/>
+        <a:font script="Osma" typeface="Ebrima"/>
+        <a:font script="Phag" typeface="Phagspa"/>
+        <a:font script="Syrn" typeface="Estrangelo Edessa"/>
+        <a:font script="Syrj" typeface="Estrangelo Edessa"/>
+        <a:font script="Syre" typeface="Estrangelo Edessa"/>
+        <a:font script="Sora" typeface="Nirmala UI"/>
+        <a:font script="Tale" typeface="Microsoft Tai Le"/>
+        <a:font script="Talu" typeface="Microsoft New Tai Lue"/>
+        <a:font script="Tfng" typeface="Ebrima"/>
+      </a:minorFont>
+    </a:fontScheme>
+    <a:fmtScheme name="Office">
+      <a:fillStyleLst>
+        <a:solidFill>
+          <a:schemeClr val="phClr"/>
+        </a:solidFill>
+        <a:gradFill rotWithShape="1">
+          <a:gsLst>
+            <a:gs pos="0">
+              <a:schemeClr val="phClr">
+                <a:lumMod val="110000"/>
+                <a:satMod val="105000"/>
+                <a:tint val="67000"/>
+              </a:schemeClr>
+            </a:gs>
+            <a:gs pos="50000">
+              <a:schemeClr val="phClr">
+                <a:lumMod val="105000"/>
+                <a:satMod val="103000"/>
+                <a:tint val="73000"/>
+              </a:schemeClr>
+            </a:gs>
+            <a:gs pos="100000">
+              <a:schemeClr val="phClr">
+                <a:lumMod val="105000"/>
+                <a:satMod val="109000"/>
+                <a:tint val="81000"/>
+              </a:schemeClr>
+            </a:gs>
+          </a:gsLst>
+          <a:lin ang="5400000" scaled="0"/>
+        </a:gradFill>
+        <a:gradFill rotWithShape="1">
+          <a:gsLst>
+            <a:gs pos="0">
+              <a:schemeClr val="phClr">
+                <a:satMod val="103000"/>
+                <a:lumMod val="102000"/>
+                <a:tint val="94000"/>
+              </a:schemeClr>
+            </a:gs>
+            <a:gs pos="50000">
+              <a:schemeClr val="phClr">
+                <a:satMod val="110000"/>
+                <a:lumMod val="100000"/>
+                <a:shade val="100000"/>
+              </a:schemeClr>
+            </a:gs>
+            <a:gs pos="100000">
+              <a:schemeClr val="phClr">
+                <a:lumMod val="99000"/>
+                <a:satMod val="120000"/>
+                <a:shade val="78000"/>
+              </a:schemeClr>
+            </a:gs>
+          </a:gsLst>
+          <a:lin ang="5400000" scaled="0"/>
+        </a:gradFill>
+      </a:fillStyleLst>
+      <a:lnStyleLst>
+        <a:ln w="12700" cap="flat" cmpd="sng" algn="ctr">
+          <a:solidFill>
+            <a:schemeClr val="phClr"/>
+          </a:solidFill>
+          <a:prstDash val="solid"/>
+          <a:miter lim="800000"/>
+        </a:ln>
+        <a:ln w="19050" cap="flat" cmpd="sng" algn="ctr">
+          <a:solidFill>
+            <a:schemeClr val="phClr"/>
+          </a:solidFill>
+          <a:prstDash val="solid"/>
+          <a:miter lim="800000"/>
+        </a:ln>
+        <a:ln w="25400" cap="flat" cmpd="sng" algn="ctr">
+          <a:solidFill>
+            <a:schemeClr val="phClr"/>
+          </a:solidFill>
+          <a:prstDash val="solid"/>
+          <a:miter lim="800000"/>
+        </a:ln>
+      </a:lnStyleLst>
+      <a:effectStyleLst>
+        <a:effectStyle>
+          <a:effectLst/>
+        </a:effectStyle>
+        <a:effectStyle>
+          <a:effectLst/>
+        </a:effectStyle>
+        <a:effectStyle>
+          <a:effectLst>
+            <a:outerShdw blurRad="57150" dist="19050" dir="5400000" algn="ctr" rotWithShape="0">
+              <a:srgbClr val="000000">
+                <a:alpha val="63000"/>
+              </a:srgbClr>
+            </a:outerShdw>
+          </a:effectLst>
+        </a:effectStyle>
+      </a:effectStyleLst>
+      <a:bgFillStyleLst>
+        <a:solidFill>
+          <a:schemeClr val="phClr"/>
+        </a:solidFill>
+        <a:solidFill>
+          <a:schemeClr val="phClr">
+            <a:tint val="95000"/>
+            <a:satMod val="170000"/>
+          </a:schemeClr>
+        </a:solidFill>
+        <a:gradFill rotWithShape="1">
+          <a:gsLst>
+            <a:gs pos="0">
+              <a:schemeClr val="phClr">
+                <a:tint val="93000"/>
+                <a:satMod val="150000"/>
+                <a:shade val="98000"/>
+                <a:lumMod val="102000"/>
+              </a:schemeClr>
+            </a:gs>
+            <a:gs pos="50000">
+              <a:schemeClr val="phClr">
+                <a:tint val="98000"/>
+                <a:satMod val="130000"/>
+                <a:shade val="90000"/>
+                <a:lumMod val="103000"/>
+              </a:schemeClr>
+            </a:gs>
+            <a:gs pos="100000">
+              <a:schemeClr val="phClr">
+                <a:shade val="63000"/>
+                <a:satMod val="120000"/>
+              </a:schemeClr>
+            </a:gs>
+          </a:gsLst>
+          <a:lin ang="5400000" scaled="0"/>
+        </a:gradFill>
+      </a:bgFillStyleLst>
+    </a:fmtScheme>
+  </a:themeElements>
+  <a:objectDefaults>
+    <a:lnDef>
+      <a:spPr/>
+      <a:bodyPr/>
+      <a:lstStyle/>
+      <a:style>
+        <a:lnRef idx="2">
+          <a:schemeClr val="accent1"/>
+        </a:lnRef>
+        <a:fillRef idx="0">
+          <a:schemeClr val="accent1"/>
+        </a:fillRef>
+        <a:effectRef idx="1">
+          <a:schemeClr val="accent1"/>
+        </a:effectRef>
+        <a:fontRef idx="minor">
+          <a:schemeClr val="tx1"/>
+        </a:fontRef>
+      </a:style>
+    </a:lnDef>
+  </a:objectDefaults>
+  <a:extraClrSchemeLst/>
+  <a:extLst>
+    <a:ext uri="{05A4C25C-085E-4340-85A3-A5531E510DB2}">
+      <thm15:themeFamily xmlns:thm15="http://schemas.microsoft.com/office/thememl/2012/main" name="Office Theme" id="{2E142A2C-CD16-42D6-873A-C26D2A0506FA}" vid="{1BDDFF52-6CD6-40A5-AB3C-68EB2F1E4D0A}"/>
+    </a:ext>
+  </a:extLst>
+</a:theme>
 </file>
</xml_diff>